<commit_message>
tweaked animations in pptx
</commit_message>
<xml_diff>
--- a/Calculator-MVC.pptx
+++ b/Calculator-MVC.pptx
@@ -4,17 +4,21 @@
   <p:sldMasterIdLst>
     <p:sldMasterId id="2147483648" r:id="rId1"/>
   </p:sldMasterIdLst>
+  <p:notesMasterIdLst>
+    <p:notesMasterId r:id="rId13"/>
+  </p:notesMasterIdLst>
   <p:sldIdLst>
     <p:sldId id="256" r:id="rId2"/>
-    <p:sldId id="257" r:id="rId3"/>
-    <p:sldId id="258" r:id="rId4"/>
-    <p:sldId id="259" r:id="rId5"/>
-    <p:sldId id="260" r:id="rId6"/>
-    <p:sldId id="263" r:id="rId7"/>
-    <p:sldId id="264" r:id="rId8"/>
-    <p:sldId id="261" r:id="rId9"/>
-    <p:sldId id="262" r:id="rId10"/>
-    <p:sldId id="266" r:id="rId11"/>
+    <p:sldId id="267" r:id="rId3"/>
+    <p:sldId id="257" r:id="rId4"/>
+    <p:sldId id="258" r:id="rId5"/>
+    <p:sldId id="259" r:id="rId6"/>
+    <p:sldId id="260" r:id="rId7"/>
+    <p:sldId id="263" r:id="rId8"/>
+    <p:sldId id="264" r:id="rId9"/>
+    <p:sldId id="261" r:id="rId10"/>
+    <p:sldId id="262" r:id="rId11"/>
+    <p:sldId id="266" r:id="rId12"/>
   </p:sldIdLst>
   <p:sldSz cx="12192000" cy="6858000"/>
   <p:notesSz cx="6858000" cy="9144000"/>
@@ -113,7 +117,812 @@
       </a:defRPr>
     </a:lvl9pPr>
   </p:defaultTextStyle>
+  <p:extLst>
+    <p:ext uri="{EFAFB233-063F-42B5-8137-9DF3F51BA10A}">
+      <p15:sldGuideLst xmlns:p15="http://schemas.microsoft.com/office/powerpoint/2012/main"/>
+    </p:ext>
+  </p:extLst>
 </p:presentation>
+</file>
+
+<file path=ppt/revisionInfo.xml><?xml version="1.0" encoding="utf-8"?>
+<p1510:revInfo xmlns:a="http://schemas.openxmlformats.org/drawingml/2006/main" xmlns:r="http://schemas.openxmlformats.org/officeDocument/2006/relationships" xmlns:p1510="http://schemas.microsoft.com/office/powerpoint/2015/10/main"/>
+</file>
+
+<file path=ppt/notesMasters/notesMaster1.xml><?xml version="1.0" encoding="utf-8"?>
+<p:notesMaster xmlns:a="http://schemas.openxmlformats.org/drawingml/2006/main" xmlns:r="http://schemas.openxmlformats.org/officeDocument/2006/relationships" xmlns:p="http://schemas.openxmlformats.org/presentationml/2006/main">
+  <p:cSld>
+    <p:bg>
+      <p:bgRef idx="1001">
+        <a:schemeClr val="bg1"/>
+      </p:bgRef>
+    </p:bg>
+    <p:spTree>
+      <p:nvGrpSpPr>
+        <p:cNvPr id="1" name=""/>
+        <p:cNvGrpSpPr/>
+        <p:nvPr/>
+      </p:nvGrpSpPr>
+      <p:grpSpPr>
+        <a:xfrm>
+          <a:off x="0" y="0"/>
+          <a:ext cx="0" cy="0"/>
+          <a:chOff x="0" y="0"/>
+          <a:chExt cx="0" cy="0"/>
+        </a:xfrm>
+      </p:grpSpPr>
+      <p:sp>
+        <p:nvSpPr>
+          <p:cNvPr id="2" name="Header Placeholder 1"/>
+          <p:cNvSpPr>
+            <a:spLocks noGrp="1"/>
+          </p:cNvSpPr>
+          <p:nvPr>
+            <p:ph type="hdr" sz="quarter"/>
+          </p:nvPr>
+        </p:nvSpPr>
+        <p:spPr>
+          <a:xfrm>
+            <a:off x="0" y="0"/>
+            <a:ext cx="2971800" cy="458788"/>
+          </a:xfrm>
+          <a:prstGeom prst="rect">
+            <a:avLst/>
+          </a:prstGeom>
+        </p:spPr>
+        <p:txBody>
+          <a:bodyPr vert="horz" lIns="91440" tIns="45720" rIns="91440" bIns="45720" rtlCol="0"/>
+          <a:lstStyle>
+            <a:lvl1pPr algn="l">
+              <a:defRPr sz="1200"/>
+            </a:lvl1pPr>
+          </a:lstStyle>
+          <a:p>
+            <a:endParaRPr lang="en-US"/>
+          </a:p>
+        </p:txBody>
+      </p:sp>
+      <p:sp>
+        <p:nvSpPr>
+          <p:cNvPr id="3" name="Date Placeholder 2"/>
+          <p:cNvSpPr>
+            <a:spLocks noGrp="1"/>
+          </p:cNvSpPr>
+          <p:nvPr>
+            <p:ph type="dt" idx="1"/>
+          </p:nvPr>
+        </p:nvSpPr>
+        <p:spPr>
+          <a:xfrm>
+            <a:off x="3884613" y="0"/>
+            <a:ext cx="2971800" cy="458788"/>
+          </a:xfrm>
+          <a:prstGeom prst="rect">
+            <a:avLst/>
+          </a:prstGeom>
+        </p:spPr>
+        <p:txBody>
+          <a:bodyPr vert="horz" lIns="91440" tIns="45720" rIns="91440" bIns="45720" rtlCol="0"/>
+          <a:lstStyle>
+            <a:lvl1pPr algn="r">
+              <a:defRPr sz="1200"/>
+            </a:lvl1pPr>
+          </a:lstStyle>
+          <a:p>
+            <a:fld id="{E13CD9DE-CB13-46CE-905A-29E10803332C}" type="datetimeFigureOut">
+              <a:rPr lang="en-US" smtClean="0"/>
+              <a:t>4/26/2018</a:t>
+            </a:fld>
+            <a:endParaRPr lang="en-US"/>
+          </a:p>
+        </p:txBody>
+      </p:sp>
+      <p:sp>
+        <p:nvSpPr>
+          <p:cNvPr id="4" name="Slide Image Placeholder 3"/>
+          <p:cNvSpPr>
+            <a:spLocks noGrp="1" noRot="1" noChangeAspect="1"/>
+          </p:cNvSpPr>
+          <p:nvPr>
+            <p:ph type="sldImg" idx="2"/>
+          </p:nvPr>
+        </p:nvSpPr>
+        <p:spPr>
+          <a:xfrm>
+            <a:off x="685800" y="1143000"/>
+            <a:ext cx="5486400" cy="3086100"/>
+          </a:xfrm>
+          <a:prstGeom prst="rect">
+            <a:avLst/>
+          </a:prstGeom>
+          <a:noFill/>
+          <a:ln w="12700">
+            <a:solidFill>
+              <a:prstClr val="black"/>
+            </a:solidFill>
+          </a:ln>
+        </p:spPr>
+        <p:txBody>
+          <a:bodyPr vert="horz" lIns="91440" tIns="45720" rIns="91440" bIns="45720" rtlCol="0" anchor="ctr"/>
+          <a:lstStyle/>
+          <a:p>
+            <a:endParaRPr lang="en-US"/>
+          </a:p>
+        </p:txBody>
+      </p:sp>
+      <p:sp>
+        <p:nvSpPr>
+          <p:cNvPr id="5" name="Notes Placeholder 4"/>
+          <p:cNvSpPr>
+            <a:spLocks noGrp="1"/>
+          </p:cNvSpPr>
+          <p:nvPr>
+            <p:ph type="body" sz="quarter" idx="3"/>
+          </p:nvPr>
+        </p:nvSpPr>
+        <p:spPr>
+          <a:xfrm>
+            <a:off x="685800" y="4400550"/>
+            <a:ext cx="5486400" cy="3600450"/>
+          </a:xfrm>
+          <a:prstGeom prst="rect">
+            <a:avLst/>
+          </a:prstGeom>
+        </p:spPr>
+        <p:txBody>
+          <a:bodyPr vert="horz" lIns="91440" tIns="45720" rIns="91440" bIns="45720" rtlCol="0"/>
+          <a:lstStyle/>
+          <a:p>
+            <a:pPr lvl="0"/>
+            <a:r>
+              <a:rPr lang="en-US"/>
+              <a:t>Edit Master text styles</a:t>
+            </a:r>
+          </a:p>
+          <a:p>
+            <a:pPr lvl="1"/>
+            <a:r>
+              <a:rPr lang="en-US"/>
+              <a:t>Second level</a:t>
+            </a:r>
+          </a:p>
+          <a:p>
+            <a:pPr lvl="2"/>
+            <a:r>
+              <a:rPr lang="en-US"/>
+              <a:t>Third level</a:t>
+            </a:r>
+          </a:p>
+          <a:p>
+            <a:pPr lvl="3"/>
+            <a:r>
+              <a:rPr lang="en-US"/>
+              <a:t>Fourth level</a:t>
+            </a:r>
+          </a:p>
+          <a:p>
+            <a:pPr lvl="4"/>
+            <a:r>
+              <a:rPr lang="en-US"/>
+              <a:t>Fifth level</a:t>
+            </a:r>
+          </a:p>
+        </p:txBody>
+      </p:sp>
+      <p:sp>
+        <p:nvSpPr>
+          <p:cNvPr id="6" name="Footer Placeholder 5"/>
+          <p:cNvSpPr>
+            <a:spLocks noGrp="1"/>
+          </p:cNvSpPr>
+          <p:nvPr>
+            <p:ph type="ftr" sz="quarter" idx="4"/>
+          </p:nvPr>
+        </p:nvSpPr>
+        <p:spPr>
+          <a:xfrm>
+            <a:off x="0" y="8685213"/>
+            <a:ext cx="2971800" cy="458787"/>
+          </a:xfrm>
+          <a:prstGeom prst="rect">
+            <a:avLst/>
+          </a:prstGeom>
+        </p:spPr>
+        <p:txBody>
+          <a:bodyPr vert="horz" lIns="91440" tIns="45720" rIns="91440" bIns="45720" rtlCol="0" anchor="b"/>
+          <a:lstStyle>
+            <a:lvl1pPr algn="l">
+              <a:defRPr sz="1200"/>
+            </a:lvl1pPr>
+          </a:lstStyle>
+          <a:p>
+            <a:endParaRPr lang="en-US"/>
+          </a:p>
+        </p:txBody>
+      </p:sp>
+      <p:sp>
+        <p:nvSpPr>
+          <p:cNvPr id="7" name="Slide Number Placeholder 6"/>
+          <p:cNvSpPr>
+            <a:spLocks noGrp="1"/>
+          </p:cNvSpPr>
+          <p:nvPr>
+            <p:ph type="sldNum" sz="quarter" idx="5"/>
+          </p:nvPr>
+        </p:nvSpPr>
+        <p:spPr>
+          <a:xfrm>
+            <a:off x="3884613" y="8685213"/>
+            <a:ext cx="2971800" cy="458787"/>
+          </a:xfrm>
+          <a:prstGeom prst="rect">
+            <a:avLst/>
+          </a:prstGeom>
+        </p:spPr>
+        <p:txBody>
+          <a:bodyPr vert="horz" lIns="91440" tIns="45720" rIns="91440" bIns="45720" rtlCol="0" anchor="b"/>
+          <a:lstStyle>
+            <a:lvl1pPr algn="r">
+              <a:defRPr sz="1200"/>
+            </a:lvl1pPr>
+          </a:lstStyle>
+          <a:p>
+            <a:fld id="{CDC1541C-DB57-4CFA-8C0F-082D1C84AD02}" type="slidenum">
+              <a:rPr lang="en-US" smtClean="0"/>
+              <a:t>‹#›</a:t>
+            </a:fld>
+            <a:endParaRPr lang="en-US"/>
+          </a:p>
+        </p:txBody>
+      </p:sp>
+    </p:spTree>
+    <p:extLst>
+      <p:ext uri="{BB962C8B-B14F-4D97-AF65-F5344CB8AC3E}">
+        <p14:creationId xmlns:p14="http://schemas.microsoft.com/office/powerpoint/2010/main" val="3689016402"/>
+      </p:ext>
+    </p:extLst>
+  </p:cSld>
+  <p:clrMap bg1="lt1" tx1="dk1" bg2="lt2" tx2="dk2" accent1="accent1" accent2="accent2" accent3="accent3" accent4="accent4" accent5="accent5" accent6="accent6" hlink="hlink" folHlink="folHlink"/>
+  <p:notesStyle>
+    <a:lvl1pPr marL="0" algn="l" defTabSz="914400" rtl="0" eaLnBrk="1" latinLnBrk="0" hangingPunct="1">
+      <a:defRPr sz="1200" kern="1200">
+        <a:solidFill>
+          <a:schemeClr val="tx1"/>
+        </a:solidFill>
+        <a:latin typeface="+mn-lt"/>
+        <a:ea typeface="+mn-ea"/>
+        <a:cs typeface="+mn-cs"/>
+      </a:defRPr>
+    </a:lvl1pPr>
+    <a:lvl2pPr marL="457200" algn="l" defTabSz="914400" rtl="0" eaLnBrk="1" latinLnBrk="0" hangingPunct="1">
+      <a:defRPr sz="1200" kern="1200">
+        <a:solidFill>
+          <a:schemeClr val="tx1"/>
+        </a:solidFill>
+        <a:latin typeface="+mn-lt"/>
+        <a:ea typeface="+mn-ea"/>
+        <a:cs typeface="+mn-cs"/>
+      </a:defRPr>
+    </a:lvl2pPr>
+    <a:lvl3pPr marL="914400" algn="l" defTabSz="914400" rtl="0" eaLnBrk="1" latinLnBrk="0" hangingPunct="1">
+      <a:defRPr sz="1200" kern="1200">
+        <a:solidFill>
+          <a:schemeClr val="tx1"/>
+        </a:solidFill>
+        <a:latin typeface="+mn-lt"/>
+        <a:ea typeface="+mn-ea"/>
+        <a:cs typeface="+mn-cs"/>
+      </a:defRPr>
+    </a:lvl3pPr>
+    <a:lvl4pPr marL="1371600" algn="l" defTabSz="914400" rtl="0" eaLnBrk="1" latinLnBrk="0" hangingPunct="1">
+      <a:defRPr sz="1200" kern="1200">
+        <a:solidFill>
+          <a:schemeClr val="tx1"/>
+        </a:solidFill>
+        <a:latin typeface="+mn-lt"/>
+        <a:ea typeface="+mn-ea"/>
+        <a:cs typeface="+mn-cs"/>
+      </a:defRPr>
+    </a:lvl4pPr>
+    <a:lvl5pPr marL="1828800" algn="l" defTabSz="914400" rtl="0" eaLnBrk="1" latinLnBrk="0" hangingPunct="1">
+      <a:defRPr sz="1200" kern="1200">
+        <a:solidFill>
+          <a:schemeClr val="tx1"/>
+        </a:solidFill>
+        <a:latin typeface="+mn-lt"/>
+        <a:ea typeface="+mn-ea"/>
+        <a:cs typeface="+mn-cs"/>
+      </a:defRPr>
+    </a:lvl5pPr>
+    <a:lvl6pPr marL="2286000" algn="l" defTabSz="914400" rtl="0" eaLnBrk="1" latinLnBrk="0" hangingPunct="1">
+      <a:defRPr sz="1200" kern="1200">
+        <a:solidFill>
+          <a:schemeClr val="tx1"/>
+        </a:solidFill>
+        <a:latin typeface="+mn-lt"/>
+        <a:ea typeface="+mn-ea"/>
+        <a:cs typeface="+mn-cs"/>
+      </a:defRPr>
+    </a:lvl6pPr>
+    <a:lvl7pPr marL="2743200" algn="l" defTabSz="914400" rtl="0" eaLnBrk="1" latinLnBrk="0" hangingPunct="1">
+      <a:defRPr sz="1200" kern="1200">
+        <a:solidFill>
+          <a:schemeClr val="tx1"/>
+        </a:solidFill>
+        <a:latin typeface="+mn-lt"/>
+        <a:ea typeface="+mn-ea"/>
+        <a:cs typeface="+mn-cs"/>
+      </a:defRPr>
+    </a:lvl7pPr>
+    <a:lvl8pPr marL="3200400" algn="l" defTabSz="914400" rtl="0" eaLnBrk="1" latinLnBrk="0" hangingPunct="1">
+      <a:defRPr sz="1200" kern="1200">
+        <a:solidFill>
+          <a:schemeClr val="tx1"/>
+        </a:solidFill>
+        <a:latin typeface="+mn-lt"/>
+        <a:ea typeface="+mn-ea"/>
+        <a:cs typeface="+mn-cs"/>
+      </a:defRPr>
+    </a:lvl8pPr>
+    <a:lvl9pPr marL="3657600" algn="l" defTabSz="914400" rtl="0" eaLnBrk="1" latinLnBrk="0" hangingPunct="1">
+      <a:defRPr sz="1200" kern="1200">
+        <a:solidFill>
+          <a:schemeClr val="tx1"/>
+        </a:solidFill>
+        <a:latin typeface="+mn-lt"/>
+        <a:ea typeface="+mn-ea"/>
+        <a:cs typeface="+mn-cs"/>
+      </a:defRPr>
+    </a:lvl9pPr>
+  </p:notesStyle>
+</p:notesMaster>
+</file>
+
+<file path=ppt/notesSlides/notesSlide1.xml><?xml version="1.0" encoding="utf-8"?>
+<p:notes xmlns:a="http://schemas.openxmlformats.org/drawingml/2006/main" xmlns:r="http://schemas.openxmlformats.org/officeDocument/2006/relationships" xmlns:p="http://schemas.openxmlformats.org/presentationml/2006/main">
+  <p:cSld>
+    <p:spTree>
+      <p:nvGrpSpPr>
+        <p:cNvPr id="1" name=""/>
+        <p:cNvGrpSpPr/>
+        <p:nvPr/>
+      </p:nvGrpSpPr>
+      <p:grpSpPr>
+        <a:xfrm>
+          <a:off x="0" y="0"/>
+          <a:ext cx="0" cy="0"/>
+          <a:chOff x="0" y="0"/>
+          <a:chExt cx="0" cy="0"/>
+        </a:xfrm>
+      </p:grpSpPr>
+      <p:sp>
+        <p:nvSpPr>
+          <p:cNvPr id="2" name="Slide Image Placeholder 1"/>
+          <p:cNvSpPr>
+            <a:spLocks noGrp="1" noRot="1" noChangeAspect="1"/>
+          </p:cNvSpPr>
+          <p:nvPr>
+            <p:ph type="sldImg"/>
+          </p:nvPr>
+        </p:nvSpPr>
+        <p:spPr/>
+      </p:sp>
+      <p:sp>
+        <p:nvSpPr>
+          <p:cNvPr id="3" name="Notes Placeholder 2"/>
+          <p:cNvSpPr>
+            <a:spLocks noGrp="1"/>
+          </p:cNvSpPr>
+          <p:nvPr>
+            <p:ph type="body" idx="1"/>
+          </p:nvPr>
+        </p:nvSpPr>
+        <p:spPr/>
+        <p:txBody>
+          <a:bodyPr/>
+          <a:lstStyle/>
+          <a:p>
+            <a:endParaRPr lang="en-US" dirty="0"/>
+          </a:p>
+        </p:txBody>
+      </p:sp>
+      <p:sp>
+        <p:nvSpPr>
+          <p:cNvPr id="4" name="Slide Number Placeholder 3"/>
+          <p:cNvSpPr>
+            <a:spLocks noGrp="1"/>
+          </p:cNvSpPr>
+          <p:nvPr>
+            <p:ph type="sldNum" sz="quarter" idx="10"/>
+          </p:nvPr>
+        </p:nvSpPr>
+        <p:spPr/>
+        <p:txBody>
+          <a:bodyPr/>
+          <a:lstStyle/>
+          <a:p>
+            <a:fld id="{CDC1541C-DB57-4CFA-8C0F-082D1C84AD02}" type="slidenum">
+              <a:rPr lang="en-US" smtClean="0"/>
+              <a:t>1</a:t>
+            </a:fld>
+            <a:endParaRPr lang="en-US"/>
+          </a:p>
+        </p:txBody>
+      </p:sp>
+    </p:spTree>
+    <p:extLst>
+      <p:ext uri="{BB962C8B-B14F-4D97-AF65-F5344CB8AC3E}">
+        <p14:creationId xmlns:p14="http://schemas.microsoft.com/office/powerpoint/2010/main" val="2942927516"/>
+      </p:ext>
+    </p:extLst>
+  </p:cSld>
+  <p:clrMapOvr>
+    <a:masterClrMapping/>
+  </p:clrMapOvr>
+</p:notes>
+</file>
+
+<file path=ppt/notesSlides/notesSlide2.xml><?xml version="1.0" encoding="utf-8"?>
+<p:notes xmlns:a="http://schemas.openxmlformats.org/drawingml/2006/main" xmlns:r="http://schemas.openxmlformats.org/officeDocument/2006/relationships" xmlns:p="http://schemas.openxmlformats.org/presentationml/2006/main">
+  <p:cSld>
+    <p:spTree>
+      <p:nvGrpSpPr>
+        <p:cNvPr id="1" name=""/>
+        <p:cNvGrpSpPr/>
+        <p:nvPr/>
+      </p:nvGrpSpPr>
+      <p:grpSpPr>
+        <a:xfrm>
+          <a:off x="0" y="0"/>
+          <a:ext cx="0" cy="0"/>
+          <a:chOff x="0" y="0"/>
+          <a:chExt cx="0" cy="0"/>
+        </a:xfrm>
+      </p:grpSpPr>
+      <p:sp>
+        <p:nvSpPr>
+          <p:cNvPr id="2" name="Slide Image Placeholder 1"/>
+          <p:cNvSpPr>
+            <a:spLocks noGrp="1" noRot="1" noChangeAspect="1"/>
+          </p:cNvSpPr>
+          <p:nvPr>
+            <p:ph type="sldImg"/>
+          </p:nvPr>
+        </p:nvSpPr>
+        <p:spPr/>
+      </p:sp>
+      <p:sp>
+        <p:nvSpPr>
+          <p:cNvPr id="3" name="Notes Placeholder 2"/>
+          <p:cNvSpPr>
+            <a:spLocks noGrp="1"/>
+          </p:cNvSpPr>
+          <p:nvPr>
+            <p:ph type="body" idx="1"/>
+          </p:nvPr>
+        </p:nvSpPr>
+        <p:spPr/>
+        <p:txBody>
+          <a:bodyPr/>
+          <a:lstStyle/>
+          <a:p>
+            <a:r>
+              <a:rPr lang="en-US" dirty="0"/>
+              <a:t>Strategy pattern through using a Model and Controller interface</a:t>
+            </a:r>
+          </a:p>
+          <a:p>
+            <a:r>
+              <a:rPr lang="en-US" dirty="0"/>
+              <a:t>Observer pattern using Java’s own classes</a:t>
+            </a:r>
+          </a:p>
+        </p:txBody>
+      </p:sp>
+      <p:sp>
+        <p:nvSpPr>
+          <p:cNvPr id="4" name="Slide Number Placeholder 3"/>
+          <p:cNvSpPr>
+            <a:spLocks noGrp="1"/>
+          </p:cNvSpPr>
+          <p:nvPr>
+            <p:ph type="sldNum" sz="quarter" idx="10"/>
+          </p:nvPr>
+        </p:nvSpPr>
+        <p:spPr/>
+        <p:txBody>
+          <a:bodyPr/>
+          <a:lstStyle/>
+          <a:p>
+            <a:fld id="{CDC1541C-DB57-4CFA-8C0F-082D1C84AD02}" type="slidenum">
+              <a:rPr lang="en-US" smtClean="0"/>
+              <a:t>3</a:t>
+            </a:fld>
+            <a:endParaRPr lang="en-US"/>
+          </a:p>
+        </p:txBody>
+      </p:sp>
+    </p:spTree>
+    <p:extLst>
+      <p:ext uri="{BB962C8B-B14F-4D97-AF65-F5344CB8AC3E}">
+        <p14:creationId xmlns:p14="http://schemas.microsoft.com/office/powerpoint/2010/main" val="1977328902"/>
+      </p:ext>
+    </p:extLst>
+  </p:cSld>
+  <p:clrMapOvr>
+    <a:masterClrMapping/>
+  </p:clrMapOvr>
+</p:notes>
+</file>
+
+<file path=ppt/notesSlides/notesSlide3.xml><?xml version="1.0" encoding="utf-8"?>
+<p:notes xmlns:a="http://schemas.openxmlformats.org/drawingml/2006/main" xmlns:r="http://schemas.openxmlformats.org/officeDocument/2006/relationships" xmlns:p="http://schemas.openxmlformats.org/presentationml/2006/main">
+  <p:cSld>
+    <p:spTree>
+      <p:nvGrpSpPr>
+        <p:cNvPr id="1" name=""/>
+        <p:cNvGrpSpPr/>
+        <p:nvPr/>
+      </p:nvGrpSpPr>
+      <p:grpSpPr>
+        <a:xfrm>
+          <a:off x="0" y="0"/>
+          <a:ext cx="0" cy="0"/>
+          <a:chOff x="0" y="0"/>
+          <a:chExt cx="0" cy="0"/>
+        </a:xfrm>
+      </p:grpSpPr>
+      <p:sp>
+        <p:nvSpPr>
+          <p:cNvPr id="2" name="Slide Image Placeholder 1"/>
+          <p:cNvSpPr>
+            <a:spLocks noGrp="1" noRot="1" noChangeAspect="1"/>
+          </p:cNvSpPr>
+          <p:nvPr>
+            <p:ph type="sldImg"/>
+          </p:nvPr>
+        </p:nvSpPr>
+        <p:spPr/>
+      </p:sp>
+      <p:sp>
+        <p:nvSpPr>
+          <p:cNvPr id="3" name="Notes Placeholder 2"/>
+          <p:cNvSpPr>
+            <a:spLocks noGrp="1"/>
+          </p:cNvSpPr>
+          <p:nvPr>
+            <p:ph type="body" idx="1"/>
+          </p:nvPr>
+        </p:nvSpPr>
+        <p:spPr/>
+        <p:txBody>
+          <a:bodyPr/>
+          <a:lstStyle/>
+          <a:p>
+            <a:r>
+              <a:rPr lang="en-US" dirty="0"/>
+              <a:t>Note that there is no responsibility for logic, that’s to be handled elsewhere</a:t>
+            </a:r>
+          </a:p>
+        </p:txBody>
+      </p:sp>
+      <p:sp>
+        <p:nvSpPr>
+          <p:cNvPr id="4" name="Slide Number Placeholder 3"/>
+          <p:cNvSpPr>
+            <a:spLocks noGrp="1"/>
+          </p:cNvSpPr>
+          <p:nvPr>
+            <p:ph type="sldNum" sz="quarter" idx="10"/>
+          </p:nvPr>
+        </p:nvSpPr>
+        <p:spPr/>
+        <p:txBody>
+          <a:bodyPr/>
+          <a:lstStyle/>
+          <a:p>
+            <a:fld id="{CDC1541C-DB57-4CFA-8C0F-082D1C84AD02}" type="slidenum">
+              <a:rPr lang="en-US" smtClean="0"/>
+              <a:t>4</a:t>
+            </a:fld>
+            <a:endParaRPr lang="en-US"/>
+          </a:p>
+        </p:txBody>
+      </p:sp>
+    </p:spTree>
+    <p:extLst>
+      <p:ext uri="{BB962C8B-B14F-4D97-AF65-F5344CB8AC3E}">
+        <p14:creationId xmlns:p14="http://schemas.microsoft.com/office/powerpoint/2010/main" val="319138554"/>
+      </p:ext>
+    </p:extLst>
+  </p:cSld>
+  <p:clrMapOvr>
+    <a:masterClrMapping/>
+  </p:clrMapOvr>
+</p:notes>
+</file>
+
+<file path=ppt/notesSlides/notesSlide4.xml><?xml version="1.0" encoding="utf-8"?>
+<p:notes xmlns:a="http://schemas.openxmlformats.org/drawingml/2006/main" xmlns:r="http://schemas.openxmlformats.org/officeDocument/2006/relationships" xmlns:p="http://schemas.openxmlformats.org/presentationml/2006/main">
+  <p:cSld>
+    <p:spTree>
+      <p:nvGrpSpPr>
+        <p:cNvPr id="1" name=""/>
+        <p:cNvGrpSpPr/>
+        <p:nvPr/>
+      </p:nvGrpSpPr>
+      <p:grpSpPr>
+        <a:xfrm>
+          <a:off x="0" y="0"/>
+          <a:ext cx="0" cy="0"/>
+          <a:chOff x="0" y="0"/>
+          <a:chExt cx="0" cy="0"/>
+        </a:xfrm>
+      </p:grpSpPr>
+      <p:sp>
+        <p:nvSpPr>
+          <p:cNvPr id="2" name="Slide Image Placeholder 1"/>
+          <p:cNvSpPr>
+            <a:spLocks noGrp="1" noRot="1" noChangeAspect="1"/>
+          </p:cNvSpPr>
+          <p:nvPr>
+            <p:ph type="sldImg"/>
+          </p:nvPr>
+        </p:nvSpPr>
+        <p:spPr/>
+      </p:sp>
+      <p:sp>
+        <p:nvSpPr>
+          <p:cNvPr id="3" name="Notes Placeholder 2"/>
+          <p:cNvSpPr>
+            <a:spLocks noGrp="1"/>
+          </p:cNvSpPr>
+          <p:nvPr>
+            <p:ph type="body" idx="1"/>
+          </p:nvPr>
+        </p:nvSpPr>
+        <p:spPr/>
+        <p:txBody>
+          <a:bodyPr/>
+          <a:lstStyle/>
+          <a:p>
+            <a:r>
+              <a:rPr lang="en-US" dirty="0"/>
+              <a:t>Constructor takes the interfaces</a:t>
+            </a:r>
+          </a:p>
+          <a:p>
+            <a:r>
+              <a:rPr lang="en-US" dirty="0"/>
+              <a:t>GUI is created when called by the Controller</a:t>
+            </a:r>
+          </a:p>
+          <a:p>
+            <a:r>
+              <a:rPr lang="en-US" dirty="0"/>
+              <a:t>Action Listeners are added in the FOR loop but will be handled by the Controller</a:t>
+            </a:r>
+          </a:p>
+        </p:txBody>
+      </p:sp>
+      <p:sp>
+        <p:nvSpPr>
+          <p:cNvPr id="4" name="Slide Number Placeholder 3"/>
+          <p:cNvSpPr>
+            <a:spLocks noGrp="1"/>
+          </p:cNvSpPr>
+          <p:nvPr>
+            <p:ph type="sldNum" sz="quarter" idx="10"/>
+          </p:nvPr>
+        </p:nvSpPr>
+        <p:spPr/>
+        <p:txBody>
+          <a:bodyPr/>
+          <a:lstStyle/>
+          <a:p>
+            <a:fld id="{CDC1541C-DB57-4CFA-8C0F-082D1C84AD02}" type="slidenum">
+              <a:rPr lang="en-US" smtClean="0"/>
+              <a:t>5</a:t>
+            </a:fld>
+            <a:endParaRPr lang="en-US"/>
+          </a:p>
+        </p:txBody>
+      </p:sp>
+    </p:spTree>
+    <p:extLst>
+      <p:ext uri="{BB962C8B-B14F-4D97-AF65-F5344CB8AC3E}">
+        <p14:creationId xmlns:p14="http://schemas.microsoft.com/office/powerpoint/2010/main" val="335020172"/>
+      </p:ext>
+    </p:extLst>
+  </p:cSld>
+  <p:clrMapOvr>
+    <a:masterClrMapping/>
+  </p:clrMapOvr>
+</p:notes>
+</file>
+
+<file path=ppt/notesSlides/notesSlide5.xml><?xml version="1.0" encoding="utf-8"?>
+<p:notes xmlns:a="http://schemas.openxmlformats.org/drawingml/2006/main" xmlns:r="http://schemas.openxmlformats.org/officeDocument/2006/relationships" xmlns:p="http://schemas.openxmlformats.org/presentationml/2006/main">
+  <p:cSld>
+    <p:spTree>
+      <p:nvGrpSpPr>
+        <p:cNvPr id="1" name=""/>
+        <p:cNvGrpSpPr/>
+        <p:nvPr/>
+      </p:nvGrpSpPr>
+      <p:grpSpPr>
+        <a:xfrm>
+          <a:off x="0" y="0"/>
+          <a:ext cx="0" cy="0"/>
+          <a:chOff x="0" y="0"/>
+          <a:chExt cx="0" cy="0"/>
+        </a:xfrm>
+      </p:grpSpPr>
+      <p:sp>
+        <p:nvSpPr>
+          <p:cNvPr id="2" name="Slide Image Placeholder 1"/>
+          <p:cNvSpPr>
+            <a:spLocks noGrp="1" noRot="1" noChangeAspect="1"/>
+          </p:cNvSpPr>
+          <p:nvPr>
+            <p:ph type="sldImg"/>
+          </p:nvPr>
+        </p:nvSpPr>
+        <p:spPr/>
+      </p:sp>
+      <p:sp>
+        <p:nvSpPr>
+          <p:cNvPr id="3" name="Notes Placeholder 2"/>
+          <p:cNvSpPr>
+            <a:spLocks noGrp="1"/>
+          </p:cNvSpPr>
+          <p:nvPr>
+            <p:ph type="body" idx="1"/>
+          </p:nvPr>
+        </p:nvSpPr>
+        <p:spPr/>
+        <p:txBody>
+          <a:bodyPr/>
+          <a:lstStyle/>
+          <a:p>
+            <a:endParaRPr lang="en-US" dirty="0"/>
+          </a:p>
+        </p:txBody>
+      </p:sp>
+      <p:sp>
+        <p:nvSpPr>
+          <p:cNvPr id="4" name="Slide Number Placeholder 3"/>
+          <p:cNvSpPr>
+            <a:spLocks noGrp="1"/>
+          </p:cNvSpPr>
+          <p:nvPr>
+            <p:ph type="sldNum" sz="quarter" idx="10"/>
+          </p:nvPr>
+        </p:nvSpPr>
+        <p:spPr/>
+        <p:txBody>
+          <a:bodyPr/>
+          <a:lstStyle/>
+          <a:p>
+            <a:fld id="{CDC1541C-DB57-4CFA-8C0F-082D1C84AD02}" type="slidenum">
+              <a:rPr lang="en-US" smtClean="0"/>
+              <a:t>6</a:t>
+            </a:fld>
+            <a:endParaRPr lang="en-US"/>
+          </a:p>
+        </p:txBody>
+      </p:sp>
+    </p:spTree>
+    <p:extLst>
+      <p:ext uri="{BB962C8B-B14F-4D97-AF65-F5344CB8AC3E}">
+        <p14:creationId xmlns:p14="http://schemas.microsoft.com/office/powerpoint/2010/main" val="3555330190"/>
+      </p:ext>
+    </p:extLst>
+  </p:cSld>
+  <p:clrMapOvr>
+    <a:masterClrMapping/>
+  </p:clrMapOvr>
+</p:notes>
 </file>
 
 <file path=ppt/slideLayouts/slideLayout1.xml><?xml version="1.0" encoding="utf-8"?>
@@ -173,7 +982,7 @@
           <a:noFill/>
           <a:extLst>
             <a:ext uri="{909E8E84-426E-40dd-AFC4-6F175D3DCCD1}">
-              <a14:hiddenFill xmlns:a14="http://schemas.microsoft.com/office/drawing/2010/main" xmlns="">
+              <a14:hiddenFill xmlns="" xmlns:a14="http://schemas.microsoft.com/office/drawing/2010/main">
                 <a:solidFill>
                   <a:srgbClr val="FFFFFF"/>
                 </a:solidFill>
@@ -232,7 +1041,7 @@
             </a:ln>
             <a:extLst>
               <a:ext uri="{91240B29-F687-4f45-9708-019B960494DF}">
-                <a14:hiddenLine xmlns:a14="http://schemas.microsoft.com/office/drawing/2010/main" xmlns="" w="9525">
+                <a14:hiddenLine xmlns="" xmlns:a14="http://schemas.microsoft.com/office/drawing/2010/main" w="9525">
                   <a:solidFill>
                     <a:srgbClr val="000000"/>
                   </a:solidFill>
@@ -322,7 +1131,7 @@
             </a:ln>
             <a:extLst>
               <a:ext uri="{91240B29-F687-4f45-9708-019B960494DF}">
-                <a14:hiddenLine xmlns:a14="http://schemas.microsoft.com/office/drawing/2010/main" xmlns="" w="9525">
+                <a14:hiddenLine xmlns="" xmlns:a14="http://schemas.microsoft.com/office/drawing/2010/main" w="9525">
                   <a:solidFill>
                     <a:srgbClr val="000000"/>
                   </a:solidFill>
@@ -412,7 +1221,7 @@
             </a:ln>
             <a:extLst>
               <a:ext uri="{91240B29-F687-4f45-9708-019B960494DF}">
-                <a14:hiddenLine xmlns:a14="http://schemas.microsoft.com/office/drawing/2010/main" xmlns="" w="9525">
+                <a14:hiddenLine xmlns="" xmlns:a14="http://schemas.microsoft.com/office/drawing/2010/main" w="9525">
                   <a:solidFill>
                     <a:srgbClr val="000000"/>
                   </a:solidFill>
@@ -446,7 +1255,7 @@
             </a:ln>
             <a:extLst>
               <a:ext uri="{91240B29-F687-4f45-9708-019B960494DF}">
-                <a14:hiddenLine xmlns:a14="http://schemas.microsoft.com/office/drawing/2010/main" xmlns="" w="9525">
+                <a14:hiddenLine xmlns="" xmlns:a14="http://schemas.microsoft.com/office/drawing/2010/main" w="9525">
                   <a:solidFill>
                     <a:srgbClr val="000000"/>
                   </a:solidFill>
@@ -536,7 +1345,7 @@
             </a:ln>
             <a:extLst>
               <a:ext uri="{91240B29-F687-4f45-9708-019B960494DF}">
-                <a14:hiddenLine xmlns:a14="http://schemas.microsoft.com/office/drawing/2010/main" xmlns="" w="9525">
+                <a14:hiddenLine xmlns="" xmlns:a14="http://schemas.microsoft.com/office/drawing/2010/main" w="9525">
                   <a:solidFill>
                     <a:srgbClr val="000000"/>
                   </a:solidFill>
@@ -598,7 +1407,7 @@
             </a:ln>
             <a:extLst>
               <a:ext uri="{91240B29-F687-4f45-9708-019B960494DF}">
-                <a14:hiddenLine xmlns:a14="http://schemas.microsoft.com/office/drawing/2010/main" xmlns="" w="9525">
+                <a14:hiddenLine xmlns="" xmlns:a14="http://schemas.microsoft.com/office/drawing/2010/main" w="9525">
                   <a:solidFill>
                     <a:srgbClr val="000000"/>
                   </a:solidFill>
@@ -660,7 +1469,7 @@
             </a:ln>
             <a:extLst>
               <a:ext uri="{91240B29-F687-4f45-9708-019B960494DF}">
-                <a14:hiddenLine xmlns:a14="http://schemas.microsoft.com/office/drawing/2010/main" xmlns="" w="9525">
+                <a14:hiddenLine xmlns="" xmlns:a14="http://schemas.microsoft.com/office/drawing/2010/main" w="9525">
                   <a:solidFill>
                     <a:srgbClr val="000000"/>
                   </a:solidFill>
@@ -750,7 +1559,7 @@
             </a:ln>
             <a:extLst>
               <a:ext uri="{91240B29-F687-4f45-9708-019B960494DF}">
-                <a14:hiddenLine xmlns:a14="http://schemas.microsoft.com/office/drawing/2010/main" xmlns="" w="9525">
+                <a14:hiddenLine xmlns="" xmlns:a14="http://schemas.microsoft.com/office/drawing/2010/main" w="9525">
                   <a:solidFill>
                     <a:srgbClr val="000000"/>
                   </a:solidFill>
@@ -812,7 +1621,7 @@
             </a:ln>
             <a:extLst>
               <a:ext uri="{91240B29-F687-4f45-9708-019B960494DF}">
-                <a14:hiddenLine xmlns:a14="http://schemas.microsoft.com/office/drawing/2010/main" xmlns="" w="9525">
+                <a14:hiddenLine xmlns="" xmlns:a14="http://schemas.microsoft.com/office/drawing/2010/main" w="9525">
                   <a:solidFill>
                     <a:srgbClr val="000000"/>
                   </a:solidFill>
@@ -874,7 +1683,7 @@
             </a:ln>
             <a:extLst>
               <a:ext uri="{91240B29-F687-4f45-9708-019B960494DF}">
-                <a14:hiddenLine xmlns:a14="http://schemas.microsoft.com/office/drawing/2010/main" xmlns="" w="9525">
+                <a14:hiddenLine xmlns="" xmlns:a14="http://schemas.microsoft.com/office/drawing/2010/main" w="9525">
                   <a:solidFill>
                     <a:srgbClr val="000000"/>
                   </a:solidFill>
@@ -964,7 +1773,7 @@
             </a:ln>
             <a:extLst>
               <a:ext uri="{91240B29-F687-4f45-9708-019B960494DF}">
-                <a14:hiddenLine xmlns:a14="http://schemas.microsoft.com/office/drawing/2010/main" xmlns="" w="9525">
+                <a14:hiddenLine xmlns="" xmlns:a14="http://schemas.microsoft.com/office/drawing/2010/main" w="9525">
                   <a:solidFill>
                     <a:srgbClr val="000000"/>
                   </a:solidFill>
@@ -1054,7 +1863,7 @@
             </a:ln>
             <a:extLst>
               <a:ext uri="{91240B29-F687-4f45-9708-019B960494DF}">
-                <a14:hiddenLine xmlns:a14="http://schemas.microsoft.com/office/drawing/2010/main" xmlns="" w="9525">
+                <a14:hiddenLine xmlns="" xmlns:a14="http://schemas.microsoft.com/office/drawing/2010/main" w="9525">
                   <a:solidFill>
                     <a:srgbClr val="000000"/>
                   </a:solidFill>
@@ -1116,7 +1925,7 @@
             </a:ln>
             <a:extLst>
               <a:ext uri="{91240B29-F687-4f45-9708-019B960494DF}">
-                <a14:hiddenLine xmlns:a14="http://schemas.microsoft.com/office/drawing/2010/main" xmlns="" w="9525">
+                <a14:hiddenLine xmlns="" xmlns:a14="http://schemas.microsoft.com/office/drawing/2010/main" w="9525">
                   <a:solidFill>
                     <a:srgbClr val="000000"/>
                   </a:solidFill>
@@ -1226,7 +2035,7 @@
             </a:ln>
             <a:extLst>
               <a:ext uri="{91240B29-F687-4f45-9708-019B960494DF}">
-                <a14:hiddenLine xmlns:a14="http://schemas.microsoft.com/office/drawing/2010/main" xmlns="" w="9525">
+                <a14:hiddenLine xmlns="" xmlns:a14="http://schemas.microsoft.com/office/drawing/2010/main" w="9525">
                   <a:solidFill>
                     <a:srgbClr val="000000"/>
                   </a:solidFill>
@@ -1288,7 +2097,7 @@
             </a:ln>
             <a:extLst>
               <a:ext uri="{91240B29-F687-4f45-9708-019B960494DF}">
-                <a14:hiddenLine xmlns:a14="http://schemas.microsoft.com/office/drawing/2010/main" xmlns="" w="9525">
+                <a14:hiddenLine xmlns="" xmlns:a14="http://schemas.microsoft.com/office/drawing/2010/main" w="9525">
                   <a:solidFill>
                     <a:srgbClr val="000000"/>
                   </a:solidFill>
@@ -1378,7 +2187,7 @@
             </a:ln>
             <a:extLst>
               <a:ext uri="{91240B29-F687-4f45-9708-019B960494DF}">
-                <a14:hiddenLine xmlns:a14="http://schemas.microsoft.com/office/drawing/2010/main" xmlns="" w="9525">
+                <a14:hiddenLine xmlns="" xmlns:a14="http://schemas.microsoft.com/office/drawing/2010/main" w="9525">
                   <a:solidFill>
                     <a:srgbClr val="000000"/>
                   </a:solidFill>
@@ -1468,7 +2277,7 @@
             </a:ln>
             <a:extLst>
               <a:ext uri="{91240B29-F687-4f45-9708-019B960494DF}">
-                <a14:hiddenLine xmlns:a14="http://schemas.microsoft.com/office/drawing/2010/main" xmlns="" w="9525">
+                <a14:hiddenLine xmlns="" xmlns:a14="http://schemas.microsoft.com/office/drawing/2010/main" w="9525">
                   <a:solidFill>
                     <a:srgbClr val="000000"/>
                   </a:solidFill>
@@ -1530,7 +2339,7 @@
             </a:ln>
             <a:extLst>
               <a:ext uri="{91240B29-F687-4f45-9708-019B960494DF}">
-                <a14:hiddenLine xmlns:a14="http://schemas.microsoft.com/office/drawing/2010/main" xmlns="" w="9525">
+                <a14:hiddenLine xmlns="" xmlns:a14="http://schemas.microsoft.com/office/drawing/2010/main" w="9525">
                   <a:solidFill>
                     <a:srgbClr val="000000"/>
                   </a:solidFill>
@@ -1620,7 +2429,7 @@
             </a:ln>
             <a:extLst>
               <a:ext uri="{91240B29-F687-4f45-9708-019B960494DF}">
-                <a14:hiddenLine xmlns:a14="http://schemas.microsoft.com/office/drawing/2010/main" xmlns="" w="9525">
+                <a14:hiddenLine xmlns="" xmlns:a14="http://schemas.microsoft.com/office/drawing/2010/main" w="9525">
                   <a:solidFill>
                     <a:srgbClr val="000000"/>
                   </a:solidFill>
@@ -1710,7 +2519,7 @@
             </a:ln>
             <a:extLst>
               <a:ext uri="{91240B29-F687-4f45-9708-019B960494DF}">
-                <a14:hiddenLine xmlns:a14="http://schemas.microsoft.com/office/drawing/2010/main" xmlns="" w="9525">
+                <a14:hiddenLine xmlns="" xmlns:a14="http://schemas.microsoft.com/office/drawing/2010/main" w="9525">
                   <a:solidFill>
                     <a:srgbClr val="000000"/>
                   </a:solidFill>
@@ -1766,7 +2575,7 @@
             </a:ln>
             <a:extLst>
               <a:ext uri="{91240B29-F687-4f45-9708-019B960494DF}">
-                <a14:hiddenLine xmlns:a14="http://schemas.microsoft.com/office/drawing/2010/main" xmlns="" w="9525">
+                <a14:hiddenLine xmlns="" xmlns:a14="http://schemas.microsoft.com/office/drawing/2010/main" w="9525">
                   <a:solidFill>
                     <a:srgbClr val="000000"/>
                   </a:solidFill>
@@ -1856,7 +2665,7 @@
             </a:ln>
             <a:extLst>
               <a:ext uri="{91240B29-F687-4f45-9708-019B960494DF}">
-                <a14:hiddenLine xmlns:a14="http://schemas.microsoft.com/office/drawing/2010/main" xmlns="" w="9525">
+                <a14:hiddenLine xmlns="" xmlns:a14="http://schemas.microsoft.com/office/drawing/2010/main" w="9525">
                   <a:solidFill>
                     <a:srgbClr val="000000"/>
                   </a:solidFill>
@@ -1912,7 +2721,7 @@
             </a:ln>
             <a:extLst>
               <a:ext uri="{91240B29-F687-4f45-9708-019B960494DF}">
-                <a14:hiddenLine xmlns:a14="http://schemas.microsoft.com/office/drawing/2010/main" xmlns="" w="9525">
+                <a14:hiddenLine xmlns="" xmlns:a14="http://schemas.microsoft.com/office/drawing/2010/main" w="9525">
                   <a:solidFill>
                     <a:srgbClr val="000000"/>
                   </a:solidFill>
@@ -2002,7 +2811,7 @@
             </a:ln>
             <a:extLst>
               <a:ext uri="{91240B29-F687-4f45-9708-019B960494DF}">
-                <a14:hiddenLine xmlns:a14="http://schemas.microsoft.com/office/drawing/2010/main" xmlns="" w="9525">
+                <a14:hiddenLine xmlns="" xmlns:a14="http://schemas.microsoft.com/office/drawing/2010/main" w="9525">
                   <a:solidFill>
                     <a:srgbClr val="000000"/>
                   </a:solidFill>
@@ -2070,7 +2879,7 @@
             </a:ln>
             <a:extLst>
               <a:ext uri="{91240B29-F687-4f45-9708-019B960494DF}">
-                <a14:hiddenLine xmlns:a14="http://schemas.microsoft.com/office/drawing/2010/main" xmlns="" w="9525">
+                <a14:hiddenLine xmlns="" xmlns:a14="http://schemas.microsoft.com/office/drawing/2010/main" w="9525">
                   <a:solidFill>
                     <a:srgbClr val="000000"/>
                   </a:solidFill>
@@ -2160,7 +2969,7 @@
             </a:ln>
             <a:extLst>
               <a:ext uri="{91240B29-F687-4f45-9708-019B960494DF}">
-                <a14:hiddenLine xmlns:a14="http://schemas.microsoft.com/office/drawing/2010/main" xmlns="" w="9525">
+                <a14:hiddenLine xmlns="" xmlns:a14="http://schemas.microsoft.com/office/drawing/2010/main" w="9525">
                   <a:solidFill>
                     <a:srgbClr val="000000"/>
                   </a:solidFill>
@@ -2228,7 +3037,7 @@
             </a:ln>
             <a:extLst>
               <a:ext uri="{91240B29-F687-4f45-9708-019B960494DF}">
-                <a14:hiddenLine xmlns:a14="http://schemas.microsoft.com/office/drawing/2010/main" xmlns="" w="9525">
+                <a14:hiddenLine xmlns="" xmlns:a14="http://schemas.microsoft.com/office/drawing/2010/main" w="9525">
                   <a:solidFill>
                     <a:srgbClr val="000000"/>
                   </a:solidFill>
@@ -2318,7 +3127,7 @@
             </a:ln>
             <a:extLst>
               <a:ext uri="{91240B29-F687-4f45-9708-019B960494DF}">
-                <a14:hiddenLine xmlns:a14="http://schemas.microsoft.com/office/drawing/2010/main" xmlns="" w="9525">
+                <a14:hiddenLine xmlns="" xmlns:a14="http://schemas.microsoft.com/office/drawing/2010/main" w="9525">
                   <a:solidFill>
                     <a:srgbClr val="000000"/>
                   </a:solidFill>
@@ -2352,7 +3161,7 @@
             </a:ln>
             <a:extLst>
               <a:ext uri="{91240B29-F687-4f45-9708-019B960494DF}">
-                <a14:hiddenLine xmlns:a14="http://schemas.microsoft.com/office/drawing/2010/main" xmlns="" w="9525">
+                <a14:hiddenLine xmlns="" xmlns:a14="http://schemas.microsoft.com/office/drawing/2010/main" w="9525">
                   <a:solidFill>
                     <a:srgbClr val="000000"/>
                   </a:solidFill>
@@ -2442,7 +3251,7 @@
             </a:ln>
             <a:extLst>
               <a:ext uri="{91240B29-F687-4f45-9708-019B960494DF}">
-                <a14:hiddenLine xmlns:a14="http://schemas.microsoft.com/office/drawing/2010/main" xmlns="" w="9525">
+                <a14:hiddenLine xmlns="" xmlns:a14="http://schemas.microsoft.com/office/drawing/2010/main" w="9525">
                   <a:solidFill>
                     <a:srgbClr val="000000"/>
                   </a:solidFill>
@@ -2504,7 +3313,7 @@
             </a:ln>
             <a:extLst>
               <a:ext uri="{91240B29-F687-4f45-9708-019B960494DF}">
-                <a14:hiddenLine xmlns:a14="http://schemas.microsoft.com/office/drawing/2010/main" xmlns="" w="9525">
+                <a14:hiddenLine xmlns="" xmlns:a14="http://schemas.microsoft.com/office/drawing/2010/main" w="9525">
                   <a:solidFill>
                     <a:srgbClr val="000000"/>
                   </a:solidFill>
@@ -2566,7 +3375,7 @@
             </a:ln>
             <a:extLst>
               <a:ext uri="{91240B29-F687-4f45-9708-019B960494DF}">
-                <a14:hiddenLine xmlns:a14="http://schemas.microsoft.com/office/drawing/2010/main" xmlns="" w="9525">
+                <a14:hiddenLine xmlns="" xmlns:a14="http://schemas.microsoft.com/office/drawing/2010/main" w="9525">
                   <a:solidFill>
                     <a:srgbClr val="000000"/>
                   </a:solidFill>
@@ -2656,7 +3465,7 @@
             </a:ln>
             <a:extLst>
               <a:ext uri="{91240B29-F687-4f45-9708-019B960494DF}">
-                <a14:hiddenLine xmlns:a14="http://schemas.microsoft.com/office/drawing/2010/main" xmlns="" w="9525">
+                <a14:hiddenLine xmlns="" xmlns:a14="http://schemas.microsoft.com/office/drawing/2010/main" w="9525">
                   <a:solidFill>
                     <a:srgbClr val="000000"/>
                   </a:solidFill>
@@ -2724,7 +3533,7 @@
             </a:ln>
             <a:extLst>
               <a:ext uri="{91240B29-F687-4f45-9708-019B960494DF}">
-                <a14:hiddenLine xmlns:a14="http://schemas.microsoft.com/office/drawing/2010/main" xmlns="" w="9525">
+                <a14:hiddenLine xmlns="" xmlns:a14="http://schemas.microsoft.com/office/drawing/2010/main" w="9525">
                   <a:solidFill>
                     <a:srgbClr val="000000"/>
                   </a:solidFill>
@@ -2786,7 +3595,7 @@
             </a:ln>
             <a:extLst>
               <a:ext uri="{91240B29-F687-4f45-9708-019B960494DF}">
-                <a14:hiddenLine xmlns:a14="http://schemas.microsoft.com/office/drawing/2010/main" xmlns="" w="9525">
+                <a14:hiddenLine xmlns="" xmlns:a14="http://schemas.microsoft.com/office/drawing/2010/main" w="9525">
                   <a:solidFill>
                     <a:srgbClr val="000000"/>
                   </a:solidFill>
@@ -2876,7 +3685,7 @@
             </a:ln>
             <a:extLst>
               <a:ext uri="{91240B29-F687-4f45-9708-019B960494DF}">
-                <a14:hiddenLine xmlns:a14="http://schemas.microsoft.com/office/drawing/2010/main" xmlns="" w="9525">
+                <a14:hiddenLine xmlns="" xmlns:a14="http://schemas.microsoft.com/office/drawing/2010/main" w="9525">
                   <a:solidFill>
                     <a:srgbClr val="000000"/>
                   </a:solidFill>
@@ -2938,7 +3747,7 @@
             </a:ln>
             <a:extLst>
               <a:ext uri="{91240B29-F687-4f45-9708-019B960494DF}">
-                <a14:hiddenLine xmlns:a14="http://schemas.microsoft.com/office/drawing/2010/main" xmlns="" w="9525">
+                <a14:hiddenLine xmlns="" xmlns:a14="http://schemas.microsoft.com/office/drawing/2010/main" w="9525">
                   <a:solidFill>
                     <a:srgbClr val="000000"/>
                   </a:solidFill>
@@ -3028,7 +3837,7 @@
             </a:ln>
             <a:extLst>
               <a:ext uri="{91240B29-F687-4f45-9708-019B960494DF}">
-                <a14:hiddenLine xmlns:a14="http://schemas.microsoft.com/office/drawing/2010/main" xmlns="" w="9525">
+                <a14:hiddenLine xmlns="" xmlns:a14="http://schemas.microsoft.com/office/drawing/2010/main" w="9525">
                   <a:solidFill>
                     <a:srgbClr val="000000"/>
                   </a:solidFill>
@@ -3090,7 +3899,7 @@
             </a:ln>
             <a:extLst>
               <a:ext uri="{91240B29-F687-4f45-9708-019B960494DF}">
-                <a14:hiddenLine xmlns:a14="http://schemas.microsoft.com/office/drawing/2010/main" xmlns="" w="9525">
+                <a14:hiddenLine xmlns="" xmlns:a14="http://schemas.microsoft.com/office/drawing/2010/main" w="9525">
                   <a:solidFill>
                     <a:srgbClr val="000000"/>
                   </a:solidFill>
@@ -3180,7 +3989,7 @@
             </a:ln>
             <a:extLst>
               <a:ext uri="{91240B29-F687-4f45-9708-019B960494DF}">
-                <a14:hiddenLine xmlns:a14="http://schemas.microsoft.com/office/drawing/2010/main" xmlns="" w="9525">
+                <a14:hiddenLine xmlns="" xmlns:a14="http://schemas.microsoft.com/office/drawing/2010/main" w="9525">
                   <a:solidFill>
                     <a:srgbClr val="000000"/>
                   </a:solidFill>
@@ -3214,7 +4023,7 @@
             </a:ln>
             <a:extLst>
               <a:ext uri="{91240B29-F687-4f45-9708-019B960494DF}">
-                <a14:hiddenLine xmlns:a14="http://schemas.microsoft.com/office/drawing/2010/main" xmlns="" w="9525">
+                <a14:hiddenLine xmlns="" xmlns:a14="http://schemas.microsoft.com/office/drawing/2010/main" w="9525">
                   <a:solidFill>
                     <a:srgbClr val="000000"/>
                   </a:solidFill>
@@ -3279,7 +4088,7 @@
             </a:ln>
             <a:extLst>
               <a:ext uri="{91240B29-F687-4f45-9708-019B960494DF}">
-                <a14:hiddenLine xmlns:a14="http://schemas.microsoft.com/office/drawing/2010/main" xmlns="" w="9525">
+                <a14:hiddenLine xmlns="" xmlns:a14="http://schemas.microsoft.com/office/drawing/2010/main" w="9525">
                   <a:solidFill>
                     <a:srgbClr val="000000"/>
                   </a:solidFill>
@@ -3369,7 +4178,7 @@
             </a:ln>
             <a:extLst>
               <a:ext uri="{91240B29-F687-4f45-9708-019B960494DF}">
-                <a14:hiddenLine xmlns:a14="http://schemas.microsoft.com/office/drawing/2010/main" xmlns="" w="9525">
+                <a14:hiddenLine xmlns="" xmlns:a14="http://schemas.microsoft.com/office/drawing/2010/main" w="9525">
                   <a:solidFill>
                     <a:srgbClr val="000000"/>
                   </a:solidFill>
@@ -3431,7 +4240,7 @@
             </a:ln>
             <a:extLst>
               <a:ext uri="{91240B29-F687-4f45-9708-019B960494DF}">
-                <a14:hiddenLine xmlns:a14="http://schemas.microsoft.com/office/drawing/2010/main" xmlns="" w="9525">
+                <a14:hiddenLine xmlns="" xmlns:a14="http://schemas.microsoft.com/office/drawing/2010/main" w="9525">
                   <a:solidFill>
                     <a:srgbClr val="000000"/>
                   </a:solidFill>
@@ -3521,7 +4330,7 @@
             </a:ln>
             <a:extLst>
               <a:ext uri="{91240B29-F687-4f45-9708-019B960494DF}">
-                <a14:hiddenLine xmlns:a14="http://schemas.microsoft.com/office/drawing/2010/main" xmlns="" w="9525">
+                <a14:hiddenLine xmlns="" xmlns:a14="http://schemas.microsoft.com/office/drawing/2010/main" w="9525">
                   <a:solidFill>
                     <a:srgbClr val="000000"/>
                   </a:solidFill>
@@ -3611,7 +4420,7 @@
             </a:ln>
             <a:extLst>
               <a:ext uri="{91240B29-F687-4f45-9708-019B960494DF}">
-                <a14:hiddenLine xmlns:a14="http://schemas.microsoft.com/office/drawing/2010/main" xmlns="" w="9525">
+                <a14:hiddenLine xmlns="" xmlns:a14="http://schemas.microsoft.com/office/drawing/2010/main" w="9525">
                   <a:solidFill>
                     <a:srgbClr val="000000"/>
                   </a:solidFill>
@@ -3676,7 +4485,7 @@
             </a:ln>
             <a:extLst>
               <a:ext uri="{91240B29-F687-4f45-9708-019B960494DF}">
-                <a14:hiddenLine xmlns:a14="http://schemas.microsoft.com/office/drawing/2010/main" xmlns="" w="9525">
+                <a14:hiddenLine xmlns="" xmlns:a14="http://schemas.microsoft.com/office/drawing/2010/main" w="9525">
                   <a:solidFill>
                     <a:srgbClr val="000000"/>
                   </a:solidFill>
@@ -3738,7 +4547,7 @@
             </a:ln>
             <a:extLst>
               <a:ext uri="{91240B29-F687-4f45-9708-019B960494DF}">
-                <a14:hiddenLine xmlns:a14="http://schemas.microsoft.com/office/drawing/2010/main" xmlns="" w="9525">
+                <a14:hiddenLine xmlns="" xmlns:a14="http://schemas.microsoft.com/office/drawing/2010/main" w="9525">
                   <a:solidFill>
                     <a:srgbClr val="000000"/>
                   </a:solidFill>
@@ -3828,7 +4637,7 @@
             </a:ln>
             <a:extLst>
               <a:ext uri="{91240B29-F687-4f45-9708-019B960494DF}">
-                <a14:hiddenLine xmlns:a14="http://schemas.microsoft.com/office/drawing/2010/main" xmlns="" w="9525">
+                <a14:hiddenLine xmlns="" xmlns:a14="http://schemas.microsoft.com/office/drawing/2010/main" w="9525">
                   <a:solidFill>
                     <a:srgbClr val="000000"/>
                   </a:solidFill>
@@ -3918,7 +4727,7 @@
             </a:ln>
             <a:extLst>
               <a:ext uri="{91240B29-F687-4f45-9708-019B960494DF}">
-                <a14:hiddenLine xmlns:a14="http://schemas.microsoft.com/office/drawing/2010/main" xmlns="" w="9525">
+                <a14:hiddenLine xmlns="" xmlns:a14="http://schemas.microsoft.com/office/drawing/2010/main" w="9525">
                   <a:solidFill>
                     <a:srgbClr val="000000"/>
                   </a:solidFill>
@@ -3980,7 +4789,7 @@
             </a:ln>
             <a:extLst>
               <a:ext uri="{91240B29-F687-4f45-9708-019B960494DF}">
-                <a14:hiddenLine xmlns:a14="http://schemas.microsoft.com/office/drawing/2010/main" xmlns="" w="9525">
+                <a14:hiddenLine xmlns="" xmlns:a14="http://schemas.microsoft.com/office/drawing/2010/main" w="9525">
                   <a:solidFill>
                     <a:srgbClr val="000000"/>
                   </a:solidFill>
@@ -4100,7 +4909,7 @@
             </a:ln>
             <a:extLst>
               <a:ext uri="{91240B29-F687-4f45-9708-019B960494DF}">
-                <a14:hiddenLine xmlns:a14="http://schemas.microsoft.com/office/drawing/2010/main" xmlns="" w="9525">
+                <a14:hiddenLine xmlns="" xmlns:a14="http://schemas.microsoft.com/office/drawing/2010/main" w="9525">
                   <a:solidFill>
                     <a:srgbClr val="000000"/>
                   </a:solidFill>
@@ -4168,7 +4977,7 @@
             </a:ln>
             <a:extLst>
               <a:ext uri="{91240B29-F687-4f45-9708-019B960494DF}">
-                <a14:hiddenLine xmlns:a14="http://schemas.microsoft.com/office/drawing/2010/main" xmlns="" w="9525">
+                <a14:hiddenLine xmlns="" xmlns:a14="http://schemas.microsoft.com/office/drawing/2010/main" w="9525">
                   <a:solidFill>
                     <a:srgbClr val="000000"/>
                   </a:solidFill>
@@ -4258,7 +5067,7 @@
             </a:ln>
             <a:extLst>
               <a:ext uri="{91240B29-F687-4f45-9708-019B960494DF}">
-                <a14:hiddenLine xmlns:a14="http://schemas.microsoft.com/office/drawing/2010/main" xmlns="" w="9525">
+                <a14:hiddenLine xmlns="" xmlns:a14="http://schemas.microsoft.com/office/drawing/2010/main" w="9525">
                   <a:solidFill>
                     <a:srgbClr val="000000"/>
                   </a:solidFill>
@@ -8987,7 +9796,7 @@
           <a:noFill/>
           <a:extLst>
             <a:ext uri="{909E8E84-426E-40dd-AFC4-6F175D3DCCD1}">
-              <a14:hiddenFill xmlns:a14="http://schemas.microsoft.com/office/drawing/2010/main" xmlns="">
+              <a14:hiddenFill xmlns="" xmlns:a14="http://schemas.microsoft.com/office/drawing/2010/main">
                 <a:solidFill>
                   <a:srgbClr val="FFFFFF"/>
                 </a:solidFill>
@@ -9061,7 +9870,7 @@
               </a:ln>
               <a:extLst>
                 <a:ext uri="{91240B29-F687-4f45-9708-019B960494DF}">
-                  <a14:hiddenLine xmlns:a14="http://schemas.microsoft.com/office/drawing/2010/main" xmlns="" w="9525">
+                  <a14:hiddenLine xmlns="" xmlns:a14="http://schemas.microsoft.com/office/drawing/2010/main" w="9525">
                     <a:solidFill>
                       <a:srgbClr val="000000"/>
                     </a:solidFill>
@@ -9151,7 +9960,7 @@
               </a:ln>
               <a:extLst>
                 <a:ext uri="{91240B29-F687-4f45-9708-019B960494DF}">
-                  <a14:hiddenLine xmlns:a14="http://schemas.microsoft.com/office/drawing/2010/main" xmlns="" w="9525">
+                  <a14:hiddenLine xmlns="" xmlns:a14="http://schemas.microsoft.com/office/drawing/2010/main" w="9525">
                     <a:solidFill>
                       <a:srgbClr val="000000"/>
                     </a:solidFill>
@@ -9241,7 +10050,7 @@
               </a:ln>
               <a:extLst>
                 <a:ext uri="{91240B29-F687-4f45-9708-019B960494DF}">
-                  <a14:hiddenLine xmlns:a14="http://schemas.microsoft.com/office/drawing/2010/main" xmlns="" w="9525">
+                  <a14:hiddenLine xmlns="" xmlns:a14="http://schemas.microsoft.com/office/drawing/2010/main" w="9525">
                     <a:solidFill>
                       <a:srgbClr val="000000"/>
                     </a:solidFill>
@@ -9303,7 +10112,7 @@
               </a:ln>
               <a:extLst>
                 <a:ext uri="{91240B29-F687-4f45-9708-019B960494DF}">
-                  <a14:hiddenLine xmlns:a14="http://schemas.microsoft.com/office/drawing/2010/main" xmlns="" w="9525">
+                  <a14:hiddenLine xmlns="" xmlns:a14="http://schemas.microsoft.com/office/drawing/2010/main" w="9525">
                     <a:solidFill>
                       <a:srgbClr val="000000"/>
                     </a:solidFill>
@@ -9393,7 +10202,7 @@
               </a:ln>
               <a:extLst>
                 <a:ext uri="{91240B29-F687-4f45-9708-019B960494DF}">
-                  <a14:hiddenLine xmlns:a14="http://schemas.microsoft.com/office/drawing/2010/main" xmlns="" w="9525">
+                  <a14:hiddenLine xmlns="" xmlns:a14="http://schemas.microsoft.com/office/drawing/2010/main" w="9525">
                     <a:solidFill>
                       <a:srgbClr val="000000"/>
                     </a:solidFill>
@@ -9455,7 +10264,7 @@
               </a:ln>
               <a:extLst>
                 <a:ext uri="{91240B29-F687-4f45-9708-019B960494DF}">
-                  <a14:hiddenLine xmlns:a14="http://schemas.microsoft.com/office/drawing/2010/main" xmlns="" w="9525">
+                  <a14:hiddenLine xmlns="" xmlns:a14="http://schemas.microsoft.com/office/drawing/2010/main" w="9525">
                     <a:solidFill>
                       <a:srgbClr val="000000"/>
                     </a:solidFill>
@@ -9517,7 +10326,7 @@
               </a:ln>
               <a:extLst>
                 <a:ext uri="{91240B29-F687-4f45-9708-019B960494DF}">
-                  <a14:hiddenLine xmlns:a14="http://schemas.microsoft.com/office/drawing/2010/main" xmlns="" w="9525">
+                  <a14:hiddenLine xmlns="" xmlns:a14="http://schemas.microsoft.com/office/drawing/2010/main" w="9525">
                     <a:solidFill>
                       <a:srgbClr val="000000"/>
                     </a:solidFill>
@@ -9607,7 +10416,7 @@
               </a:ln>
               <a:extLst>
                 <a:ext uri="{91240B29-F687-4f45-9708-019B960494DF}">
-                  <a14:hiddenLine xmlns:a14="http://schemas.microsoft.com/office/drawing/2010/main" xmlns="" w="9525">
+                  <a14:hiddenLine xmlns="" xmlns:a14="http://schemas.microsoft.com/office/drawing/2010/main" w="9525">
                     <a:solidFill>
                       <a:srgbClr val="000000"/>
                     </a:solidFill>
@@ -9697,7 +10506,7 @@
               </a:ln>
               <a:extLst>
                 <a:ext uri="{91240B29-F687-4f45-9708-019B960494DF}">
-                  <a14:hiddenLine xmlns:a14="http://schemas.microsoft.com/office/drawing/2010/main" xmlns="" w="9525">
+                  <a14:hiddenLine xmlns="" xmlns:a14="http://schemas.microsoft.com/office/drawing/2010/main" w="9525">
                     <a:solidFill>
                       <a:srgbClr val="000000"/>
                     </a:solidFill>
@@ -9759,7 +10568,7 @@
               </a:ln>
               <a:extLst>
                 <a:ext uri="{91240B29-F687-4f45-9708-019B960494DF}">
-                  <a14:hiddenLine xmlns:a14="http://schemas.microsoft.com/office/drawing/2010/main" xmlns="" w="9525">
+                  <a14:hiddenLine xmlns="" xmlns:a14="http://schemas.microsoft.com/office/drawing/2010/main" w="9525">
                     <a:solidFill>
                       <a:srgbClr val="000000"/>
                     </a:solidFill>
@@ -9869,7 +10678,7 @@
               </a:ln>
               <a:extLst>
                 <a:ext uri="{91240B29-F687-4f45-9708-019B960494DF}">
-                  <a14:hiddenLine xmlns:a14="http://schemas.microsoft.com/office/drawing/2010/main" xmlns="" w="9525">
+                  <a14:hiddenLine xmlns="" xmlns:a14="http://schemas.microsoft.com/office/drawing/2010/main" w="9525">
                     <a:solidFill>
                       <a:srgbClr val="000000"/>
                     </a:solidFill>
@@ -9953,7 +10762,7 @@
               </a:ln>
               <a:extLst>
                 <a:ext uri="{91240B29-F687-4f45-9708-019B960494DF}">
-                  <a14:hiddenLine xmlns:a14="http://schemas.microsoft.com/office/drawing/2010/main" xmlns="" w="9525">
+                  <a14:hiddenLine xmlns="" xmlns:a14="http://schemas.microsoft.com/office/drawing/2010/main" w="9525">
                     <a:solidFill>
                       <a:srgbClr val="000000"/>
                     </a:solidFill>
@@ -10015,7 +10824,7 @@
               </a:ln>
               <a:extLst>
                 <a:ext uri="{91240B29-F687-4f45-9708-019B960494DF}">
-                  <a14:hiddenLine xmlns:a14="http://schemas.microsoft.com/office/drawing/2010/main" xmlns="" w="9525">
+                  <a14:hiddenLine xmlns="" xmlns:a14="http://schemas.microsoft.com/office/drawing/2010/main" w="9525">
                     <a:solidFill>
                       <a:srgbClr val="000000"/>
                     </a:solidFill>
@@ -10077,7 +10886,7 @@
               </a:ln>
               <a:extLst>
                 <a:ext uri="{91240B29-F687-4f45-9708-019B960494DF}">
-                  <a14:hiddenLine xmlns:a14="http://schemas.microsoft.com/office/drawing/2010/main" xmlns="" w="9525">
+                  <a14:hiddenLine xmlns="" xmlns:a14="http://schemas.microsoft.com/office/drawing/2010/main" w="9525">
                     <a:solidFill>
                       <a:srgbClr val="000000"/>
                     </a:solidFill>
@@ -10167,7 +10976,7 @@
               </a:ln>
               <a:extLst>
                 <a:ext uri="{91240B29-F687-4f45-9708-019B960494DF}">
-                  <a14:hiddenLine xmlns:a14="http://schemas.microsoft.com/office/drawing/2010/main" xmlns="" w="9525">
+                  <a14:hiddenLine xmlns="" xmlns:a14="http://schemas.microsoft.com/office/drawing/2010/main" w="9525">
                     <a:solidFill>
                       <a:srgbClr val="000000"/>
                     </a:solidFill>
@@ -10201,7 +11010,7 @@
               </a:ln>
               <a:extLst>
                 <a:ext uri="{91240B29-F687-4f45-9708-019B960494DF}">
-                  <a14:hiddenLine xmlns:a14="http://schemas.microsoft.com/office/drawing/2010/main" xmlns="" w="9525">
+                  <a14:hiddenLine xmlns="" xmlns:a14="http://schemas.microsoft.com/office/drawing/2010/main" w="9525">
                     <a:solidFill>
                       <a:srgbClr val="000000"/>
                     </a:solidFill>
@@ -10266,7 +11075,7 @@
               </a:ln>
               <a:extLst>
                 <a:ext uri="{91240B29-F687-4f45-9708-019B960494DF}">
-                  <a14:hiddenLine xmlns:a14="http://schemas.microsoft.com/office/drawing/2010/main" xmlns="" w="9525">
+                  <a14:hiddenLine xmlns="" xmlns:a14="http://schemas.microsoft.com/office/drawing/2010/main" w="9525">
                     <a:solidFill>
                       <a:srgbClr val="000000"/>
                     </a:solidFill>
@@ -10356,7 +11165,7 @@
               </a:ln>
               <a:extLst>
                 <a:ext uri="{91240B29-F687-4f45-9708-019B960494DF}">
-                  <a14:hiddenLine xmlns:a14="http://schemas.microsoft.com/office/drawing/2010/main" xmlns="" w="9525">
+                  <a14:hiddenLine xmlns="" xmlns:a14="http://schemas.microsoft.com/office/drawing/2010/main" w="9525">
                     <a:solidFill>
                       <a:srgbClr val="000000"/>
                     </a:solidFill>
@@ -10418,7 +11227,7 @@
               </a:ln>
               <a:extLst>
                 <a:ext uri="{91240B29-F687-4f45-9708-019B960494DF}">
-                  <a14:hiddenLine xmlns:a14="http://schemas.microsoft.com/office/drawing/2010/main" xmlns="" w="9525">
+                  <a14:hiddenLine xmlns="" xmlns:a14="http://schemas.microsoft.com/office/drawing/2010/main" w="9525">
                     <a:solidFill>
                       <a:srgbClr val="000000"/>
                     </a:solidFill>
@@ -10508,7 +11317,7 @@
               </a:ln>
               <a:extLst>
                 <a:ext uri="{91240B29-F687-4f45-9708-019B960494DF}">
-                  <a14:hiddenLine xmlns:a14="http://schemas.microsoft.com/office/drawing/2010/main" xmlns="" w="9525">
+                  <a14:hiddenLine xmlns="" xmlns:a14="http://schemas.microsoft.com/office/drawing/2010/main" w="9525">
                     <a:solidFill>
                       <a:srgbClr val="000000"/>
                     </a:solidFill>
@@ -10573,7 +11382,7 @@
               </a:ln>
               <a:extLst>
                 <a:ext uri="{91240B29-F687-4f45-9708-019B960494DF}">
-                  <a14:hiddenLine xmlns:a14="http://schemas.microsoft.com/office/drawing/2010/main" xmlns="" w="9525">
+                  <a14:hiddenLine xmlns="" xmlns:a14="http://schemas.microsoft.com/office/drawing/2010/main" w="9525">
                     <a:solidFill>
                       <a:srgbClr val="000000"/>
                     </a:solidFill>
@@ -10635,7 +11444,7 @@
               </a:ln>
               <a:extLst>
                 <a:ext uri="{91240B29-F687-4f45-9708-019B960494DF}">
-                  <a14:hiddenLine xmlns:a14="http://schemas.microsoft.com/office/drawing/2010/main" xmlns="" w="9525">
+                  <a14:hiddenLine xmlns="" xmlns:a14="http://schemas.microsoft.com/office/drawing/2010/main" w="9525">
                     <a:solidFill>
                       <a:srgbClr val="000000"/>
                     </a:solidFill>
@@ -10725,7 +11534,7 @@
               </a:ln>
               <a:extLst>
                 <a:ext uri="{91240B29-F687-4f45-9708-019B960494DF}">
-                  <a14:hiddenLine xmlns:a14="http://schemas.microsoft.com/office/drawing/2010/main" xmlns="" w="9525">
+                  <a14:hiddenLine xmlns="" xmlns:a14="http://schemas.microsoft.com/office/drawing/2010/main" w="9525">
                     <a:solidFill>
                       <a:srgbClr val="000000"/>
                     </a:solidFill>
@@ -10815,7 +11624,7 @@
               </a:ln>
               <a:extLst>
                 <a:ext uri="{91240B29-F687-4f45-9708-019B960494DF}">
-                  <a14:hiddenLine xmlns:a14="http://schemas.microsoft.com/office/drawing/2010/main" xmlns="" w="9525">
+                  <a14:hiddenLine xmlns="" xmlns:a14="http://schemas.microsoft.com/office/drawing/2010/main" w="9525">
                     <a:solidFill>
                       <a:srgbClr val="000000"/>
                     </a:solidFill>
@@ -10880,7 +11689,7 @@
               </a:ln>
               <a:extLst>
                 <a:ext uri="{91240B29-F687-4f45-9708-019B960494DF}">
-                  <a14:hiddenLine xmlns:a14="http://schemas.microsoft.com/office/drawing/2010/main" xmlns="" w="9525">
+                  <a14:hiddenLine xmlns="" xmlns:a14="http://schemas.microsoft.com/office/drawing/2010/main" w="9525">
                     <a:solidFill>
                       <a:srgbClr val="000000"/>
                     </a:solidFill>
@@ -11000,7 +11809,7 @@
               </a:ln>
               <a:extLst>
                 <a:ext uri="{91240B29-F687-4f45-9708-019B960494DF}">
-                  <a14:hiddenLine xmlns:a14="http://schemas.microsoft.com/office/drawing/2010/main" xmlns="" w="9525">
+                  <a14:hiddenLine xmlns="" xmlns:a14="http://schemas.microsoft.com/office/drawing/2010/main" w="9525">
                     <a:solidFill>
                       <a:srgbClr val="000000"/>
                     </a:solidFill>
@@ -11081,7 +11890,7 @@
               </a:ln>
               <a:extLst>
                 <a:ext uri="{91240B29-F687-4f45-9708-019B960494DF}">
-                  <a14:hiddenLine xmlns:a14="http://schemas.microsoft.com/office/drawing/2010/main" xmlns="" w="9525">
+                  <a14:hiddenLine xmlns="" xmlns:a14="http://schemas.microsoft.com/office/drawing/2010/main" w="9525">
                     <a:solidFill>
                       <a:srgbClr val="000000"/>
                     </a:solidFill>
@@ -11196,7 +12005,7 @@
               </a:ln>
               <a:extLst>
                 <a:ext uri="{91240B29-F687-4f45-9708-019B960494DF}">
-                  <a14:hiddenLine xmlns:a14="http://schemas.microsoft.com/office/drawing/2010/main" xmlns="" w="9525">
+                  <a14:hiddenLine xmlns="" xmlns:a14="http://schemas.microsoft.com/office/drawing/2010/main" w="9525">
                     <a:solidFill>
                       <a:srgbClr val="000000"/>
                     </a:solidFill>
@@ -11286,7 +12095,7 @@
               </a:ln>
               <a:extLst>
                 <a:ext uri="{91240B29-F687-4f45-9708-019B960494DF}">
-                  <a14:hiddenLine xmlns:a14="http://schemas.microsoft.com/office/drawing/2010/main" xmlns="" w="9525">
+                  <a14:hiddenLine xmlns="" xmlns:a14="http://schemas.microsoft.com/office/drawing/2010/main" w="9525">
                     <a:solidFill>
                       <a:srgbClr val="000000"/>
                     </a:solidFill>
@@ -11351,7 +12160,7 @@
               </a:ln>
               <a:extLst>
                 <a:ext uri="{91240B29-F687-4f45-9708-019B960494DF}">
-                  <a14:hiddenLine xmlns:a14="http://schemas.microsoft.com/office/drawing/2010/main" xmlns="" w="9525">
+                  <a14:hiddenLine xmlns="" xmlns:a14="http://schemas.microsoft.com/office/drawing/2010/main" w="9525">
                     <a:solidFill>
                       <a:srgbClr val="000000"/>
                     </a:solidFill>
@@ -11441,7 +12250,7 @@
               </a:ln>
               <a:extLst>
                 <a:ext uri="{91240B29-F687-4f45-9708-019B960494DF}">
-                  <a14:hiddenLine xmlns:a14="http://schemas.microsoft.com/office/drawing/2010/main" xmlns="" w="9525">
+                  <a14:hiddenLine xmlns="" xmlns:a14="http://schemas.microsoft.com/office/drawing/2010/main" w="9525">
                     <a:solidFill>
                       <a:srgbClr val="000000"/>
                     </a:solidFill>
@@ -11509,7 +12318,7 @@
               </a:ln>
               <a:extLst>
                 <a:ext uri="{91240B29-F687-4f45-9708-019B960494DF}">
-                  <a14:hiddenLine xmlns:a14="http://schemas.microsoft.com/office/drawing/2010/main" xmlns="" w="9525">
+                  <a14:hiddenLine xmlns="" xmlns:a14="http://schemas.microsoft.com/office/drawing/2010/main" w="9525">
                     <a:solidFill>
                       <a:srgbClr val="000000"/>
                     </a:solidFill>
@@ -11599,7 +12408,7 @@
               </a:ln>
               <a:extLst>
                 <a:ext uri="{91240B29-F687-4f45-9708-019B960494DF}">
-                  <a14:hiddenLine xmlns:a14="http://schemas.microsoft.com/office/drawing/2010/main" xmlns="" w="9525">
+                  <a14:hiddenLine xmlns="" xmlns:a14="http://schemas.microsoft.com/office/drawing/2010/main" w="9525">
                     <a:solidFill>
                       <a:srgbClr val="000000"/>
                     </a:solidFill>
@@ -11667,7 +12476,7 @@
               </a:ln>
               <a:extLst>
                 <a:ext uri="{91240B29-F687-4f45-9708-019B960494DF}">
-                  <a14:hiddenLine xmlns:a14="http://schemas.microsoft.com/office/drawing/2010/main" xmlns="" w="9525">
+                  <a14:hiddenLine xmlns="" xmlns:a14="http://schemas.microsoft.com/office/drawing/2010/main" w="9525">
                     <a:solidFill>
                       <a:srgbClr val="000000"/>
                     </a:solidFill>
@@ -11757,7 +12566,7 @@
               </a:ln>
               <a:extLst>
                 <a:ext uri="{91240B29-F687-4f45-9708-019B960494DF}">
-                  <a14:hiddenLine xmlns:a14="http://schemas.microsoft.com/office/drawing/2010/main" xmlns="" w="9525">
+                  <a14:hiddenLine xmlns="" xmlns:a14="http://schemas.microsoft.com/office/drawing/2010/main" w="9525">
                     <a:solidFill>
                       <a:srgbClr val="000000"/>
                     </a:solidFill>
@@ -11791,7 +12600,7 @@
               </a:ln>
               <a:extLst>
                 <a:ext uri="{91240B29-F687-4f45-9708-019B960494DF}">
-                  <a14:hiddenLine xmlns:a14="http://schemas.microsoft.com/office/drawing/2010/main" xmlns="" w="9525">
+                  <a14:hiddenLine xmlns="" xmlns:a14="http://schemas.microsoft.com/office/drawing/2010/main" w="9525">
                     <a:solidFill>
                       <a:srgbClr val="000000"/>
                     </a:solidFill>
@@ -12452,6 +13261,66 @@
           <a:chExt cx="0" cy="0"/>
         </a:xfrm>
       </p:grpSpPr>
+      <p:pic>
+        <p:nvPicPr>
+          <p:cNvPr id="6" name="Picture 5">
+            <a:extLst>
+              <a:ext uri="{FF2B5EF4-FFF2-40B4-BE49-F238E27FC236}">
+                <a16:creationId xmlns:a16="http://schemas.microsoft.com/office/drawing/2014/main" id="{B7F608E9-15BC-464A-AC4E-27B464BAFBD2}"/>
+              </a:ext>
+            </a:extLst>
+          </p:cNvPr>
+          <p:cNvPicPr>
+            <a:picLocks noChangeAspect="1"/>
+          </p:cNvPicPr>
+          <p:nvPr/>
+        </p:nvPicPr>
+        <p:blipFill>
+          <a:blip r:embed="rId2"/>
+          <a:stretch>
+            <a:fillRect/>
+          </a:stretch>
+        </p:blipFill>
+        <p:spPr>
+          <a:xfrm>
+            <a:off x="3371850" y="995362"/>
+            <a:ext cx="5448300" cy="4867275"/>
+          </a:xfrm>
+          <a:prstGeom prst="rect">
+            <a:avLst/>
+          </a:prstGeom>
+        </p:spPr>
+      </p:pic>
+    </p:spTree>
+    <p:extLst>
+      <p:ext uri="{BB962C8B-B14F-4D97-AF65-F5344CB8AC3E}">
+        <p14:creationId xmlns:p14="http://schemas.microsoft.com/office/powerpoint/2010/main" val="2956569673"/>
+      </p:ext>
+    </p:extLst>
+  </p:cSld>
+  <p:clrMapOvr>
+    <a:masterClrMapping/>
+  </p:clrMapOvr>
+</p:sld>
+</file>
+
+<file path=ppt/slides/slide11.xml><?xml version="1.0" encoding="utf-8"?>
+<p:sld xmlns:a="http://schemas.openxmlformats.org/drawingml/2006/main" xmlns:r="http://schemas.openxmlformats.org/officeDocument/2006/relationships" xmlns:p="http://schemas.openxmlformats.org/presentationml/2006/main">
+  <p:cSld>
+    <p:spTree>
+      <p:nvGrpSpPr>
+        <p:cNvPr id="1" name=""/>
+        <p:cNvGrpSpPr/>
+        <p:nvPr/>
+      </p:nvGrpSpPr>
+      <p:grpSpPr>
+        <a:xfrm>
+          <a:off x="0" y="0"/>
+          <a:ext cx="0" cy="0"/>
+          <a:chOff x="0" y="0"/>
+          <a:chExt cx="0" cy="0"/>
+        </a:xfrm>
+      </p:grpSpPr>
       <p:sp>
         <p:nvSpPr>
           <p:cNvPr id="2" name="Title 1">
@@ -12518,6 +13387,215 @@
       </p:grpSpPr>
       <p:pic>
         <p:nvPicPr>
+          <p:cNvPr id="1026" name="Picture 2" descr="Image result for life is good">
+            <a:extLst>
+              <a:ext uri="{FF2B5EF4-FFF2-40B4-BE49-F238E27FC236}">
+                <a16:creationId xmlns:a16="http://schemas.microsoft.com/office/drawing/2014/main" id="{D7F310ED-BD1C-4FDC-AE11-BC2A113F7F12}"/>
+              </a:ext>
+            </a:extLst>
+          </p:cNvPr>
+          <p:cNvPicPr>
+            <a:picLocks noChangeAspect="1" noChangeArrowheads="1"/>
+          </p:cNvPicPr>
+          <p:nvPr/>
+        </p:nvPicPr>
+        <p:blipFill>
+          <a:blip r:embed="rId2">
+            <a:extLst>
+              <a:ext uri="{28A0092B-C50C-407E-A947-70E740481C1C}">
+                <a14:useLocalDpi xmlns:a14="http://schemas.microsoft.com/office/drawing/2010/main" val="0"/>
+              </a:ext>
+            </a:extLst>
+          </a:blip>
+          <a:srcRect/>
+          <a:stretch>
+            <a:fillRect/>
+          </a:stretch>
+        </p:blipFill>
+        <p:spPr bwMode="auto">
+          <a:xfrm>
+            <a:off x="3281363" y="2000250"/>
+            <a:ext cx="5629275" cy="2857500"/>
+          </a:xfrm>
+          <a:prstGeom prst="rect">
+            <a:avLst/>
+          </a:prstGeom>
+          <a:noFill/>
+          <a:extLst>
+            <a:ext uri="{909E8E84-426E-40DD-AFC4-6F175D3DCCD1}">
+              <a14:hiddenFill xmlns:a14="http://schemas.microsoft.com/office/drawing/2010/main">
+                <a:solidFill>
+                  <a:srgbClr val="FFFFFF"/>
+                </a:solidFill>
+              </a14:hiddenFill>
+            </a:ext>
+          </a:extLst>
+        </p:spPr>
+      </p:pic>
+      <p:sp>
+        <p:nvSpPr>
+          <p:cNvPr id="4" name="Rectangle 3">
+            <a:extLst>
+              <a:ext uri="{FF2B5EF4-FFF2-40B4-BE49-F238E27FC236}">
+                <a16:creationId xmlns:a16="http://schemas.microsoft.com/office/drawing/2014/main" id="{8F1951A0-7B8E-4FA7-B114-8D5E894E45BE}"/>
+              </a:ext>
+            </a:extLst>
+          </p:cNvPr>
+          <p:cNvSpPr/>
+          <p:nvPr/>
+        </p:nvSpPr>
+        <p:spPr>
+          <a:xfrm>
+            <a:off x="3243532" y="1940943"/>
+            <a:ext cx="5702060" cy="2941608"/>
+          </a:xfrm>
+          <a:prstGeom prst="rect">
+            <a:avLst/>
+          </a:prstGeom>
+          <a:solidFill>
+            <a:schemeClr val="tx2">
+              <a:lumMod val="50000"/>
+            </a:schemeClr>
+          </a:solidFill>
+          <a:ln>
+            <a:noFill/>
+          </a:ln>
+        </p:spPr>
+        <p:style>
+          <a:lnRef idx="2">
+            <a:schemeClr val="accent1">
+              <a:shade val="50000"/>
+            </a:schemeClr>
+          </a:lnRef>
+          <a:fillRef idx="1">
+            <a:schemeClr val="accent1"/>
+          </a:fillRef>
+          <a:effectRef idx="0">
+            <a:schemeClr val="accent1"/>
+          </a:effectRef>
+          <a:fontRef idx="minor">
+            <a:schemeClr val="lt1"/>
+          </a:fontRef>
+        </p:style>
+        <p:txBody>
+          <a:bodyPr rtlCol="0" anchor="ctr"/>
+          <a:lstStyle/>
+          <a:p>
+            <a:pPr algn="ctr"/>
+            <a:endParaRPr lang="en-US"/>
+          </a:p>
+        </p:txBody>
+      </p:sp>
+    </p:spTree>
+    <p:extLst>
+      <p:ext uri="{BB962C8B-B14F-4D97-AF65-F5344CB8AC3E}">
+        <p14:creationId xmlns:p14="http://schemas.microsoft.com/office/powerpoint/2010/main" val="970741558"/>
+      </p:ext>
+    </p:extLst>
+  </p:cSld>
+  <p:clrMapOvr>
+    <a:masterClrMapping/>
+  </p:clrMapOvr>
+  <p:timing>
+    <p:tnLst>
+      <p:par>
+        <p:cTn id="1" dur="indefinite" restart="never" nodeType="tmRoot">
+          <p:childTnLst>
+            <p:seq concurrent="1" nextAc="seek">
+              <p:cTn id="2" dur="indefinite" nodeType="mainSeq">
+                <p:childTnLst>
+                  <p:par>
+                    <p:cTn id="3" fill="hold">
+                      <p:stCondLst>
+                        <p:cond delay="indefinite"/>
+                      </p:stCondLst>
+                      <p:childTnLst>
+                        <p:par>
+                          <p:cTn id="4" fill="hold">
+                            <p:stCondLst>
+                              <p:cond delay="0"/>
+                            </p:stCondLst>
+                            <p:childTnLst>
+                              <p:par>
+                                <p:cTn id="5" presetID="1" presetClass="exit" presetSubtype="0" fill="hold" grpId="0" nodeType="clickEffect">
+                                  <p:stCondLst>
+                                    <p:cond delay="0"/>
+                                  </p:stCondLst>
+                                  <p:childTnLst>
+                                    <p:set>
+                                      <p:cBhvr>
+                                        <p:cTn id="6" dur="1" fill="hold">
+                                          <p:stCondLst>
+                                            <p:cond delay="0"/>
+                                          </p:stCondLst>
+                                        </p:cTn>
+                                        <p:tgtEl>
+                                          <p:spTgt spid="4"/>
+                                        </p:tgtEl>
+                                        <p:attrNameLst>
+                                          <p:attrName>style.visibility</p:attrName>
+                                        </p:attrNameLst>
+                                      </p:cBhvr>
+                                      <p:to>
+                                        <p:strVal val="hidden"/>
+                                      </p:to>
+                                    </p:set>
+                                  </p:childTnLst>
+                                </p:cTn>
+                              </p:par>
+                            </p:childTnLst>
+                          </p:cTn>
+                        </p:par>
+                      </p:childTnLst>
+                    </p:cTn>
+                  </p:par>
+                </p:childTnLst>
+              </p:cTn>
+              <p:prevCondLst>
+                <p:cond evt="onPrev" delay="0">
+                  <p:tgtEl>
+                    <p:sldTgt/>
+                  </p:tgtEl>
+                </p:cond>
+              </p:prevCondLst>
+              <p:nextCondLst>
+                <p:cond evt="onNext" delay="0">
+                  <p:tgtEl>
+                    <p:sldTgt/>
+                  </p:tgtEl>
+                </p:cond>
+              </p:nextCondLst>
+            </p:seq>
+          </p:childTnLst>
+        </p:cTn>
+      </p:par>
+    </p:tnLst>
+    <p:bldLst>
+      <p:bldP spid="4" grpId="0" animBg="1"/>
+    </p:bldLst>
+  </p:timing>
+</p:sld>
+</file>
+
+<file path=ppt/slides/slide3.xml><?xml version="1.0" encoding="utf-8"?>
+<p:sld xmlns:a="http://schemas.openxmlformats.org/drawingml/2006/main" xmlns:r="http://schemas.openxmlformats.org/officeDocument/2006/relationships" xmlns:p="http://schemas.openxmlformats.org/presentationml/2006/main">
+  <p:cSld>
+    <p:spTree>
+      <p:nvGrpSpPr>
+        <p:cNvPr id="1" name=""/>
+        <p:cNvGrpSpPr/>
+        <p:nvPr/>
+      </p:nvGrpSpPr>
+      <p:grpSpPr>
+        <a:xfrm>
+          <a:off x="0" y="0"/>
+          <a:ext cx="0" cy="0"/>
+          <a:chOff x="0" y="0"/>
+          <a:chExt cx="0" cy="0"/>
+        </a:xfrm>
+      </p:grpSpPr>
+      <p:pic>
+        <p:nvPicPr>
           <p:cNvPr id="4" name="Picture 3">
             <a:extLst>
               <a:ext uri="{FF2B5EF4-FFF2-40B4-BE49-F238E27FC236}">
@@ -12531,7 +13609,7 @@
           <p:nvPr/>
         </p:nvPicPr>
         <p:blipFill>
-          <a:blip r:embed="rId2"/>
+          <a:blip r:embed="rId3"/>
           <a:stretch>
             <a:fillRect/>
           </a:stretch>
@@ -12559,7 +13637,7 @@
 </p:sld>
 </file>
 
-<file path=ppt/slides/slide3.xml><?xml version="1.0" encoding="utf-8"?>
+<file path=ppt/slides/slide4.xml><?xml version="1.0" encoding="utf-8"?>
 <p:sld xmlns:a="http://schemas.openxmlformats.org/drawingml/2006/main" xmlns:r="http://schemas.openxmlformats.org/officeDocument/2006/relationships" xmlns:p="http://schemas.openxmlformats.org/presentationml/2006/main">
   <p:cSld>
     <p:spTree>
@@ -12663,7 +13741,7 @@
 </p:sld>
 </file>
 
-<file path=ppt/slides/slide4.xml><?xml version="1.0" encoding="utf-8"?>
+<file path=ppt/slides/slide5.xml><?xml version="1.0" encoding="utf-8"?>
 <p:sld xmlns:a="http://schemas.openxmlformats.org/drawingml/2006/main" xmlns:r="http://schemas.openxmlformats.org/officeDocument/2006/relationships" xmlns:p="http://schemas.openxmlformats.org/presentationml/2006/main">
   <p:cSld>
     <p:spTree>
@@ -12695,7 +13773,7 @@
           <p:nvPr/>
         </p:nvPicPr>
         <p:blipFill>
-          <a:blip r:embed="rId2"/>
+          <a:blip r:embed="rId3"/>
           <a:stretch>
             <a:fillRect/>
           </a:stretch>
@@ -12723,7 +13801,7 @@
 </p:sld>
 </file>
 
-<file path=ppt/slides/slide5.xml><?xml version="1.0" encoding="utf-8"?>
+<file path=ppt/slides/slide6.xml><?xml version="1.0" encoding="utf-8"?>
 <p:sld xmlns:a="http://schemas.openxmlformats.org/drawingml/2006/main" xmlns:r="http://schemas.openxmlformats.org/officeDocument/2006/relationships" xmlns:p="http://schemas.openxmlformats.org/presentationml/2006/main">
   <p:cSld>
     <p:spTree>
@@ -12755,7 +13833,7 @@
           <p:nvPr/>
         </p:nvPicPr>
         <p:blipFill>
-          <a:blip r:embed="rId2"/>
+          <a:blip r:embed="rId3"/>
           <a:stretch>
             <a:fillRect/>
           </a:stretch>
@@ -12783,7 +13861,7 @@
 </p:sld>
 </file>
 
-<file path=ppt/slides/slide6.xml><?xml version="1.0" encoding="utf-8"?>
+<file path=ppt/slides/slide7.xml><?xml version="1.0" encoding="utf-8"?>
 <p:sld xmlns:a="http://schemas.openxmlformats.org/drawingml/2006/main" xmlns:r="http://schemas.openxmlformats.org/officeDocument/2006/relationships" xmlns:p="http://schemas.openxmlformats.org/presentationml/2006/main">
   <p:cSld>
     <p:spTree>
@@ -12884,7 +13962,7 @@
 </p:sld>
 </file>
 
-<file path=ppt/slides/slide7.xml><?xml version="1.0" encoding="utf-8"?>
+<file path=ppt/slides/slide8.xml><?xml version="1.0" encoding="utf-8"?>
 <p:sld xmlns:a="http://schemas.openxmlformats.org/drawingml/2006/main" xmlns:r="http://schemas.openxmlformats.org/officeDocument/2006/relationships" xmlns:p="http://schemas.openxmlformats.org/presentationml/2006/main">
   <p:cSld>
     <p:spTree>
@@ -13025,7 +14103,7 @@
 </p:sld>
 </file>
 
-<file path=ppt/slides/slide8.xml><?xml version="1.0" encoding="utf-8"?>
+<file path=ppt/slides/slide9.xml><?xml version="1.0" encoding="utf-8"?>
 <p:sld xmlns:a="http://schemas.openxmlformats.org/drawingml/2006/main" xmlns:r="http://schemas.openxmlformats.org/officeDocument/2006/relationships" xmlns:p="http://schemas.openxmlformats.org/presentationml/2006/main">
   <p:cSld>
     <p:spTree>
@@ -13108,66 +14186,6 @@
     <p:extLst>
       <p:ext uri="{BB962C8B-B14F-4D97-AF65-F5344CB8AC3E}">
         <p14:creationId xmlns:p14="http://schemas.microsoft.com/office/powerpoint/2010/main" val="3002386002"/>
-      </p:ext>
-    </p:extLst>
-  </p:cSld>
-  <p:clrMapOvr>
-    <a:masterClrMapping/>
-  </p:clrMapOvr>
-</p:sld>
-</file>
-
-<file path=ppt/slides/slide9.xml><?xml version="1.0" encoding="utf-8"?>
-<p:sld xmlns:a="http://schemas.openxmlformats.org/drawingml/2006/main" xmlns:r="http://schemas.openxmlformats.org/officeDocument/2006/relationships" xmlns:p="http://schemas.openxmlformats.org/presentationml/2006/main">
-  <p:cSld>
-    <p:spTree>
-      <p:nvGrpSpPr>
-        <p:cNvPr id="1" name=""/>
-        <p:cNvGrpSpPr/>
-        <p:nvPr/>
-      </p:nvGrpSpPr>
-      <p:grpSpPr>
-        <a:xfrm>
-          <a:off x="0" y="0"/>
-          <a:ext cx="0" cy="0"/>
-          <a:chOff x="0" y="0"/>
-          <a:chExt cx="0" cy="0"/>
-        </a:xfrm>
-      </p:grpSpPr>
-      <p:pic>
-        <p:nvPicPr>
-          <p:cNvPr id="6" name="Picture 5">
-            <a:extLst>
-              <a:ext uri="{FF2B5EF4-FFF2-40B4-BE49-F238E27FC236}">
-                <a16:creationId xmlns:a16="http://schemas.microsoft.com/office/drawing/2014/main" id="{B7F608E9-15BC-464A-AC4E-27B464BAFBD2}"/>
-              </a:ext>
-            </a:extLst>
-          </p:cNvPr>
-          <p:cNvPicPr>
-            <a:picLocks noChangeAspect="1"/>
-          </p:cNvPicPr>
-          <p:nvPr/>
-        </p:nvPicPr>
-        <p:blipFill>
-          <a:blip r:embed="rId2"/>
-          <a:stretch>
-            <a:fillRect/>
-          </a:stretch>
-        </p:blipFill>
-        <p:spPr>
-          <a:xfrm>
-            <a:off x="3371850" y="995362"/>
-            <a:ext cx="5448300" cy="4867275"/>
-          </a:xfrm>
-          <a:prstGeom prst="rect">
-            <a:avLst/>
-          </a:prstGeom>
-        </p:spPr>
-      </p:pic>
-    </p:spTree>
-    <p:extLst>
-      <p:ext uri="{BB962C8B-B14F-4D97-AF65-F5344CB8AC3E}">
-        <p14:creationId xmlns:p14="http://schemas.microsoft.com/office/powerpoint/2010/main" val="2956569673"/>
       </p:ext>
     </p:extLst>
   </p:cSld>
@@ -13426,4 +14444,299 @@
     </a:ext>
   </a:extLst>
 </a:theme>
+</file>
+
+<file path=ppt/theme/theme2.xml><?xml version="1.0" encoding="utf-8"?>
+<a:theme xmlns:a="http://schemas.openxmlformats.org/drawingml/2006/main" name="Office Theme">
+  <a:themeElements>
+    <a:clrScheme name="Office">
+      <a:dk1>
+        <a:sysClr val="windowText" lastClr="000000"/>
+      </a:dk1>
+      <a:lt1>
+        <a:sysClr val="window" lastClr="FFFFFF"/>
+      </a:lt1>
+      <a:dk2>
+        <a:srgbClr val="44546A"/>
+      </a:dk2>
+      <a:lt2>
+        <a:srgbClr val="E7E6E6"/>
+      </a:lt2>
+      <a:accent1>
+        <a:srgbClr val="4472C4"/>
+      </a:accent1>
+      <a:accent2>
+        <a:srgbClr val="ED7D31"/>
+      </a:accent2>
+      <a:accent3>
+        <a:srgbClr val="A5A5A5"/>
+      </a:accent3>
+      <a:accent4>
+        <a:srgbClr val="FFC000"/>
+      </a:accent4>
+      <a:accent5>
+        <a:srgbClr val="5B9BD5"/>
+      </a:accent5>
+      <a:accent6>
+        <a:srgbClr val="70AD47"/>
+      </a:accent6>
+      <a:hlink>
+        <a:srgbClr val="0563C1"/>
+      </a:hlink>
+      <a:folHlink>
+        <a:srgbClr val="954F72"/>
+      </a:folHlink>
+    </a:clrScheme>
+    <a:fontScheme name="Office">
+      <a:majorFont>
+        <a:latin typeface="Calibri Light" panose="020F0302020204030204"/>
+        <a:ea typeface=""/>
+        <a:cs typeface=""/>
+        <a:font script="Jpan" typeface="游ゴシック Light"/>
+        <a:font script="Hang" typeface="맑은 고딕"/>
+        <a:font script="Hans" typeface="等线 Light"/>
+        <a:font script="Hant" typeface="新細明體"/>
+        <a:font script="Arab" typeface="Times New Roman"/>
+        <a:font script="Hebr" typeface="Times New Roman"/>
+        <a:font script="Thai" typeface="Angsana New"/>
+        <a:font script="Ethi" typeface="Nyala"/>
+        <a:font script="Beng" typeface="Vrinda"/>
+        <a:font script="Gujr" typeface="Shruti"/>
+        <a:font script="Khmr" typeface="MoolBoran"/>
+        <a:font script="Knda" typeface="Tunga"/>
+        <a:font script="Guru" typeface="Raavi"/>
+        <a:font script="Cans" typeface="Euphemia"/>
+        <a:font script="Cher" typeface="Plantagenet Cherokee"/>
+        <a:font script="Yiii" typeface="Microsoft Yi Baiti"/>
+        <a:font script="Tibt" typeface="Microsoft Himalaya"/>
+        <a:font script="Thaa" typeface="MV Boli"/>
+        <a:font script="Deva" typeface="Mangal"/>
+        <a:font script="Telu" typeface="Gautami"/>
+        <a:font script="Taml" typeface="Latha"/>
+        <a:font script="Syrc" typeface="Estrangelo Edessa"/>
+        <a:font script="Orya" typeface="Kalinga"/>
+        <a:font script="Mlym" typeface="Kartika"/>
+        <a:font script="Laoo" typeface="DokChampa"/>
+        <a:font script="Sinh" typeface="Iskoola Pota"/>
+        <a:font script="Mong" typeface="Mongolian Baiti"/>
+        <a:font script="Viet" typeface="Times New Roman"/>
+        <a:font script="Uigh" typeface="Microsoft Uighur"/>
+        <a:font script="Geor" typeface="Sylfaen"/>
+        <a:font script="Armn" typeface="Arial"/>
+        <a:font script="Bugi" typeface="Leelawadee UI"/>
+        <a:font script="Bopo" typeface="Microsoft JhengHei"/>
+        <a:font script="Java" typeface="Javanese Text"/>
+        <a:font script="Lisu" typeface="Segoe UI"/>
+        <a:font script="Mymr" typeface="Myanmar Text"/>
+        <a:font script="Nkoo" typeface="Ebrima"/>
+        <a:font script="Olck" typeface="Nirmala UI"/>
+        <a:font script="Osma" typeface="Ebrima"/>
+        <a:font script="Phag" typeface="Phagspa"/>
+        <a:font script="Syrn" typeface="Estrangelo Edessa"/>
+        <a:font script="Syrj" typeface="Estrangelo Edessa"/>
+        <a:font script="Syre" typeface="Estrangelo Edessa"/>
+        <a:font script="Sora" typeface="Nirmala UI"/>
+        <a:font script="Tale" typeface="Microsoft Tai Le"/>
+        <a:font script="Talu" typeface="Microsoft New Tai Lue"/>
+        <a:font script="Tfng" typeface="Ebrima"/>
+      </a:majorFont>
+      <a:minorFont>
+        <a:latin typeface="Calibri" panose="020F0502020204030204"/>
+        <a:ea typeface=""/>
+        <a:cs typeface=""/>
+        <a:font script="Jpan" typeface="游ゴシック"/>
+        <a:font script="Hang" typeface="맑은 고딕"/>
+        <a:font script="Hans" typeface="等线"/>
+        <a:font script="Hant" typeface="新細明體"/>
+        <a:font script="Arab" typeface="Arial"/>
+        <a:font script="Hebr" typeface="Arial"/>
+        <a:font script="Thai" typeface="Cordia New"/>
+        <a:font script="Ethi" typeface="Nyala"/>
+        <a:font script="Beng" typeface="Vrinda"/>
+        <a:font script="Gujr" typeface="Shruti"/>
+        <a:font script="Khmr" typeface="DaunPenh"/>
+        <a:font script="Knda" typeface="Tunga"/>
+        <a:font script="Guru" typeface="Raavi"/>
+        <a:font script="Cans" typeface="Euphemia"/>
+        <a:font script="Cher" typeface="Plantagenet Cherokee"/>
+        <a:font script="Yiii" typeface="Microsoft Yi Baiti"/>
+        <a:font script="Tibt" typeface="Microsoft Himalaya"/>
+        <a:font script="Thaa" typeface="MV Boli"/>
+        <a:font script="Deva" typeface="Mangal"/>
+        <a:font script="Telu" typeface="Gautami"/>
+        <a:font script="Taml" typeface="Latha"/>
+        <a:font script="Syrc" typeface="Estrangelo Edessa"/>
+        <a:font script="Orya" typeface="Kalinga"/>
+        <a:font script="Mlym" typeface="Kartika"/>
+        <a:font script="Laoo" typeface="DokChampa"/>
+        <a:font script="Sinh" typeface="Iskoola Pota"/>
+        <a:font script="Mong" typeface="Mongolian Baiti"/>
+        <a:font script="Viet" typeface="Arial"/>
+        <a:font script="Uigh" typeface="Microsoft Uighur"/>
+        <a:font script="Geor" typeface="Sylfaen"/>
+        <a:font script="Armn" typeface="Arial"/>
+        <a:font script="Bugi" typeface="Leelawadee UI"/>
+        <a:font script="Bopo" typeface="Microsoft JhengHei"/>
+        <a:font script="Java" typeface="Javanese Text"/>
+        <a:font script="Lisu" typeface="Segoe UI"/>
+        <a:font script="Mymr" typeface="Myanmar Text"/>
+        <a:font script="Nkoo" typeface="Ebrima"/>
+        <a:font script="Olck" typeface="Nirmala UI"/>
+        <a:font script="Osma" typeface="Ebrima"/>
+        <a:font script="Phag" typeface="Phagspa"/>
+        <a:font script="Syrn" typeface="Estrangelo Edessa"/>
+        <a:font script="Syrj" typeface="Estrangelo Edessa"/>
+        <a:font script="Syre" typeface="Estrangelo Edessa"/>
+        <a:font script="Sora" typeface="Nirmala UI"/>
+        <a:font script="Tale" typeface="Microsoft Tai Le"/>
+        <a:font script="Talu" typeface="Microsoft New Tai Lue"/>
+        <a:font script="Tfng" typeface="Ebrima"/>
+      </a:minorFont>
+    </a:fontScheme>
+    <a:fmtScheme name="Office">
+      <a:fillStyleLst>
+        <a:solidFill>
+          <a:schemeClr val="phClr"/>
+        </a:solidFill>
+        <a:gradFill rotWithShape="1">
+          <a:gsLst>
+            <a:gs pos="0">
+              <a:schemeClr val="phClr">
+                <a:lumMod val="110000"/>
+                <a:satMod val="105000"/>
+                <a:tint val="67000"/>
+              </a:schemeClr>
+            </a:gs>
+            <a:gs pos="50000">
+              <a:schemeClr val="phClr">
+                <a:lumMod val="105000"/>
+                <a:satMod val="103000"/>
+                <a:tint val="73000"/>
+              </a:schemeClr>
+            </a:gs>
+            <a:gs pos="100000">
+              <a:schemeClr val="phClr">
+                <a:lumMod val="105000"/>
+                <a:satMod val="109000"/>
+                <a:tint val="81000"/>
+              </a:schemeClr>
+            </a:gs>
+          </a:gsLst>
+          <a:lin ang="5400000" scaled="0"/>
+        </a:gradFill>
+        <a:gradFill rotWithShape="1">
+          <a:gsLst>
+            <a:gs pos="0">
+              <a:schemeClr val="phClr">
+                <a:satMod val="103000"/>
+                <a:lumMod val="102000"/>
+                <a:tint val="94000"/>
+              </a:schemeClr>
+            </a:gs>
+            <a:gs pos="50000">
+              <a:schemeClr val="phClr">
+                <a:satMod val="110000"/>
+                <a:lumMod val="100000"/>
+                <a:shade val="100000"/>
+              </a:schemeClr>
+            </a:gs>
+            <a:gs pos="100000">
+              <a:schemeClr val="phClr">
+                <a:lumMod val="99000"/>
+                <a:satMod val="120000"/>
+                <a:shade val="78000"/>
+              </a:schemeClr>
+            </a:gs>
+          </a:gsLst>
+          <a:lin ang="5400000" scaled="0"/>
+        </a:gradFill>
+      </a:fillStyleLst>
+      <a:lnStyleLst>
+        <a:ln w="6350" cap="flat" cmpd="sng" algn="ctr">
+          <a:solidFill>
+            <a:schemeClr val="phClr"/>
+          </a:solidFill>
+          <a:prstDash val="solid"/>
+          <a:miter lim="800000"/>
+        </a:ln>
+        <a:ln w="12700" cap="flat" cmpd="sng" algn="ctr">
+          <a:solidFill>
+            <a:schemeClr val="phClr"/>
+          </a:solidFill>
+          <a:prstDash val="solid"/>
+          <a:miter lim="800000"/>
+        </a:ln>
+        <a:ln w="19050" cap="flat" cmpd="sng" algn="ctr">
+          <a:solidFill>
+            <a:schemeClr val="phClr"/>
+          </a:solidFill>
+          <a:prstDash val="solid"/>
+          <a:miter lim="800000"/>
+        </a:ln>
+      </a:lnStyleLst>
+      <a:effectStyleLst>
+        <a:effectStyle>
+          <a:effectLst/>
+        </a:effectStyle>
+        <a:effectStyle>
+          <a:effectLst/>
+        </a:effectStyle>
+        <a:effectStyle>
+          <a:effectLst>
+            <a:outerShdw blurRad="57150" dist="19050" dir="5400000" algn="ctr" rotWithShape="0">
+              <a:srgbClr val="000000">
+                <a:alpha val="63000"/>
+              </a:srgbClr>
+            </a:outerShdw>
+          </a:effectLst>
+        </a:effectStyle>
+      </a:effectStyleLst>
+      <a:bgFillStyleLst>
+        <a:solidFill>
+          <a:schemeClr val="phClr"/>
+        </a:solidFill>
+        <a:solidFill>
+          <a:schemeClr val="phClr">
+            <a:tint val="95000"/>
+            <a:satMod val="170000"/>
+          </a:schemeClr>
+        </a:solidFill>
+        <a:gradFill rotWithShape="1">
+          <a:gsLst>
+            <a:gs pos="0">
+              <a:schemeClr val="phClr">
+                <a:tint val="93000"/>
+                <a:satMod val="150000"/>
+                <a:shade val="98000"/>
+                <a:lumMod val="102000"/>
+              </a:schemeClr>
+            </a:gs>
+            <a:gs pos="50000">
+              <a:schemeClr val="phClr">
+                <a:tint val="98000"/>
+                <a:satMod val="130000"/>
+                <a:shade val="90000"/>
+                <a:lumMod val="103000"/>
+              </a:schemeClr>
+            </a:gs>
+            <a:gs pos="100000">
+              <a:schemeClr val="phClr">
+                <a:shade val="63000"/>
+                <a:satMod val="120000"/>
+              </a:schemeClr>
+            </a:gs>
+          </a:gsLst>
+          <a:lin ang="5400000" scaled="0"/>
+        </a:gradFill>
+      </a:bgFillStyleLst>
+    </a:fmtScheme>
+  </a:themeElements>
+  <a:objectDefaults/>
+  <a:extraClrSchemeLst/>
+  <a:extLst>
+    <a:ext uri="{05A4C25C-085E-4340-85A3-A5531E510DB2}">
+      <thm15:themeFamily xmlns:thm15="http://schemas.microsoft.com/office/thememl/2012/main" name="Office Theme" id="{62F939B6-93AF-4DB8-9C6B-D6C7DFDC589F}" vid="{4A3C46E8-61CC-4603-A589-7422A47A8E4A}"/>
+    </a:ext>
+  </a:extLst>
+</a:theme>
 </file>
</xml_diff>